<commit_message>
Added password strength indicator
</commit_message>
<xml_diff>
--- a/doc/phase4/Mac reflection presentation.pptx
+++ b/doc/phase4/Mac reflection presentation.pptx
@@ -15,9 +15,8 @@
     <p:sldId id="263" r:id="rId9"/>
     <p:sldId id="270" r:id="rId10"/>
     <p:sldId id="264" r:id="rId11"/>
-    <p:sldId id="265" r:id="rId12"/>
-    <p:sldId id="266" r:id="rId13"/>
-    <p:sldId id="267" r:id="rId14"/>
+    <p:sldId id="266" r:id="rId12"/>
+    <p:sldId id="267" r:id="rId13"/>
   </p:sldIdLst>
   <p:sldSz cx="9144000" cy="6858000" type="screen4x3"/>
   <p:notesSz cx="6858000" cy="9144000"/>
@@ -3495,7 +3494,12 @@
             <p:ph idx="1"/>
           </p:nvPr>
         </p:nvSpPr>
-        <p:spPr/>
+        <p:spPr>
+          <a:xfrm>
+            <a:off x="381000" y="1676400"/>
+            <a:ext cx="8229600" cy="4876800"/>
+          </a:xfrm>
+        </p:spPr>
         <p:txBody>
           <a:bodyPr>
             <a:normAutofit/>
@@ -3521,6 +3525,257 @@
           </a:p>
           <a:p>
             <a:endParaRPr lang="en-US" sz="3200" dirty="0"/>
+          </a:p>
+        </p:txBody>
+      </p:sp>
+      <p:sp>
+        <p:nvSpPr>
+          <p:cNvPr id="4" name="Title 1"/>
+          <p:cNvSpPr txBox="1">
+            <a:spLocks/>
+          </p:cNvSpPr>
+          <p:nvPr/>
+        </p:nvSpPr>
+        <p:spPr>
+          <a:xfrm>
+            <a:off x="381000" y="3505200"/>
+            <a:ext cx="8229600" cy="990600"/>
+          </a:xfrm>
+          <a:prstGeom prst="rect">
+            <a:avLst/>
+          </a:prstGeom>
+        </p:spPr>
+        <p:txBody>
+          <a:bodyPr vert="horz" lIns="91440" tIns="45720" rIns="91440" bIns="45720" rtlCol="0" anchor="ctr">
+            <a:normAutofit/>
+          </a:bodyPr>
+          <a:lstStyle>
+            <a:lvl1pPr algn="l" defTabSz="914400" rtl="0" eaLnBrk="1" latinLnBrk="0" hangingPunct="1">
+              <a:spcBef>
+                <a:spcPct val="0"/>
+              </a:spcBef>
+              <a:buNone/>
+              <a:defRPr sz="4000" kern="1200" spc="-100" baseline="0">
+                <a:solidFill>
+                  <a:schemeClr val="tx2"/>
+                </a:solidFill>
+                <a:latin typeface="+mj-lt"/>
+                <a:ea typeface="+mj-ea"/>
+                <a:cs typeface="+mj-cs"/>
+              </a:defRPr>
+            </a:lvl1pPr>
+          </a:lstStyle>
+          <a:p>
+            <a:r>
+              <a:rPr lang="en-US" dirty="0" smtClean="0"/>
+              <a:t>What is one thing we would change?</a:t>
+            </a:r>
+            <a:endParaRPr lang="en-US" dirty="0"/>
+          </a:p>
+        </p:txBody>
+      </p:sp>
+      <p:sp>
+        <p:nvSpPr>
+          <p:cNvPr id="5" name="Content Placeholder 2"/>
+          <p:cNvSpPr txBox="1">
+            <a:spLocks/>
+          </p:cNvSpPr>
+          <p:nvPr/>
+        </p:nvSpPr>
+        <p:spPr>
+          <a:xfrm>
+            <a:off x="394855" y="4530436"/>
+            <a:ext cx="8229600" cy="609600"/>
+          </a:xfrm>
+          <a:prstGeom prst="rect">
+            <a:avLst/>
+          </a:prstGeom>
+        </p:spPr>
+        <p:txBody>
+          <a:bodyPr vert="horz" lIns="91440" tIns="45720" rIns="91440" bIns="45720" rtlCol="0">
+            <a:normAutofit/>
+          </a:bodyPr>
+          <a:lstStyle>
+            <a:lvl1pPr marL="182880" indent="-182880" algn="l" defTabSz="914400" rtl="0" eaLnBrk="1" latinLnBrk="0" hangingPunct="1">
+              <a:spcBef>
+                <a:spcPct val="20000"/>
+              </a:spcBef>
+              <a:buClr>
+                <a:schemeClr val="accent1"/>
+              </a:buClr>
+              <a:buSzPct val="85000"/>
+              <a:buFont typeface="Arial" pitchFamily="34" charset="0"/>
+              <a:buChar char="•"/>
+              <a:defRPr sz="2400" kern="1200">
+                <a:solidFill>
+                  <a:schemeClr val="tx1"/>
+                </a:solidFill>
+                <a:latin typeface="+mn-lt"/>
+                <a:ea typeface="+mn-ea"/>
+                <a:cs typeface="+mn-cs"/>
+              </a:defRPr>
+            </a:lvl1pPr>
+            <a:lvl2pPr marL="457200" indent="-182880" algn="l" defTabSz="914400" rtl="0" eaLnBrk="1" latinLnBrk="0" hangingPunct="1">
+              <a:spcBef>
+                <a:spcPct val="20000"/>
+              </a:spcBef>
+              <a:buClr>
+                <a:schemeClr val="accent1"/>
+              </a:buClr>
+              <a:buSzPct val="85000"/>
+              <a:buFont typeface="Arial" pitchFamily="34" charset="0"/>
+              <a:buChar char="•"/>
+              <a:defRPr sz="2000" kern="1200">
+                <a:solidFill>
+                  <a:schemeClr val="tx1"/>
+                </a:solidFill>
+                <a:latin typeface="+mn-lt"/>
+                <a:ea typeface="+mn-ea"/>
+                <a:cs typeface="+mn-cs"/>
+              </a:defRPr>
+            </a:lvl2pPr>
+            <a:lvl3pPr marL="731520" indent="-182880" algn="l" defTabSz="914400" rtl="0" eaLnBrk="1" latinLnBrk="0" hangingPunct="1">
+              <a:spcBef>
+                <a:spcPct val="20000"/>
+              </a:spcBef>
+              <a:buClr>
+                <a:schemeClr val="accent1"/>
+              </a:buClr>
+              <a:buSzPct val="90000"/>
+              <a:buFont typeface="Arial" pitchFamily="34" charset="0"/>
+              <a:buChar char="•"/>
+              <a:defRPr sz="1800" kern="1200">
+                <a:solidFill>
+                  <a:schemeClr val="tx1"/>
+                </a:solidFill>
+                <a:latin typeface="+mn-lt"/>
+                <a:ea typeface="+mn-ea"/>
+                <a:cs typeface="+mn-cs"/>
+              </a:defRPr>
+            </a:lvl3pPr>
+            <a:lvl4pPr marL="1005840" indent="-182880" algn="l" defTabSz="914400" rtl="0" eaLnBrk="1" latinLnBrk="0" hangingPunct="1">
+              <a:spcBef>
+                <a:spcPct val="20000"/>
+              </a:spcBef>
+              <a:buClr>
+                <a:schemeClr val="accent1"/>
+              </a:buClr>
+              <a:buFont typeface="Arial" pitchFamily="34" charset="0"/>
+              <a:buChar char="•"/>
+              <a:defRPr sz="1600" kern="1200">
+                <a:solidFill>
+                  <a:schemeClr val="tx1"/>
+                </a:solidFill>
+                <a:latin typeface="+mn-lt"/>
+                <a:ea typeface="+mn-ea"/>
+                <a:cs typeface="+mn-cs"/>
+              </a:defRPr>
+            </a:lvl4pPr>
+            <a:lvl5pPr marL="1188720" indent="-137160" algn="l" defTabSz="914400" rtl="0" eaLnBrk="1" latinLnBrk="0" hangingPunct="1">
+              <a:spcBef>
+                <a:spcPct val="20000"/>
+              </a:spcBef>
+              <a:buClr>
+                <a:schemeClr val="accent1"/>
+              </a:buClr>
+              <a:buSzPct val="100000"/>
+              <a:buFont typeface="Arial" pitchFamily="34" charset="0"/>
+              <a:buChar char="•"/>
+              <a:defRPr sz="1400" kern="1200" baseline="0">
+                <a:solidFill>
+                  <a:schemeClr val="tx1"/>
+                </a:solidFill>
+                <a:latin typeface="+mn-lt"/>
+                <a:ea typeface="+mn-ea"/>
+                <a:cs typeface="+mn-cs"/>
+              </a:defRPr>
+            </a:lvl5pPr>
+            <a:lvl6pPr marL="1371600" indent="-182880" algn="l" defTabSz="914400" rtl="0" eaLnBrk="1" latinLnBrk="0" hangingPunct="1">
+              <a:spcBef>
+                <a:spcPct val="20000"/>
+              </a:spcBef>
+              <a:buClr>
+                <a:schemeClr val="accent1"/>
+              </a:buClr>
+              <a:buFont typeface="Arial" pitchFamily="34" charset="0"/>
+              <a:buChar char="•"/>
+              <a:defRPr sz="1300" kern="1200">
+                <a:solidFill>
+                  <a:schemeClr val="tx1"/>
+                </a:solidFill>
+                <a:latin typeface="+mn-lt"/>
+                <a:ea typeface="+mn-ea"/>
+                <a:cs typeface="+mn-cs"/>
+              </a:defRPr>
+            </a:lvl6pPr>
+            <a:lvl7pPr marL="1554480" indent="-182880" algn="l" defTabSz="914400" rtl="0" eaLnBrk="1" latinLnBrk="0" hangingPunct="1">
+              <a:spcBef>
+                <a:spcPct val="20000"/>
+              </a:spcBef>
+              <a:buClr>
+                <a:schemeClr val="accent1"/>
+              </a:buClr>
+              <a:buFont typeface="Arial" pitchFamily="34" charset="0"/>
+              <a:buChar char="•"/>
+              <a:defRPr sz="1300" kern="1200">
+                <a:solidFill>
+                  <a:schemeClr val="tx1"/>
+                </a:solidFill>
+                <a:latin typeface="+mn-lt"/>
+                <a:ea typeface="+mn-ea"/>
+                <a:cs typeface="+mn-cs"/>
+              </a:defRPr>
+            </a:lvl7pPr>
+            <a:lvl8pPr marL="1737360" indent="-182880" algn="l" defTabSz="914400" rtl="0" eaLnBrk="1" latinLnBrk="0" hangingPunct="1">
+              <a:spcBef>
+                <a:spcPct val="20000"/>
+              </a:spcBef>
+              <a:buClr>
+                <a:schemeClr val="accent1"/>
+              </a:buClr>
+              <a:buFont typeface="Arial" pitchFamily="34" charset="0"/>
+              <a:buChar char="•"/>
+              <a:defRPr sz="1300" kern="1200">
+                <a:solidFill>
+                  <a:schemeClr val="tx1"/>
+                </a:solidFill>
+                <a:latin typeface="+mn-lt"/>
+                <a:ea typeface="+mn-ea"/>
+                <a:cs typeface="+mn-cs"/>
+              </a:defRPr>
+            </a:lvl8pPr>
+            <a:lvl9pPr marL="1920240" indent="-182880" algn="l" defTabSz="914400" rtl="0" eaLnBrk="1" latinLnBrk="0" hangingPunct="1">
+              <a:spcBef>
+                <a:spcPct val="20000"/>
+              </a:spcBef>
+              <a:buClr>
+                <a:schemeClr val="accent1"/>
+              </a:buClr>
+              <a:buFont typeface="Arial" pitchFamily="34" charset="0"/>
+              <a:buChar char="•"/>
+              <a:defRPr sz="1300" kern="1200">
+                <a:solidFill>
+                  <a:schemeClr val="tx1"/>
+                </a:solidFill>
+                <a:latin typeface="+mn-lt"/>
+                <a:ea typeface="+mn-ea"/>
+                <a:cs typeface="+mn-cs"/>
+              </a:defRPr>
+            </a:lvl9pPr>
+          </a:lstStyle>
+          <a:p>
+            <a:r>
+              <a:rPr lang="en-US" sz="3200" dirty="0" smtClean="0"/>
+              <a:t>Focus on UI</a:t>
+            </a:r>
+          </a:p>
+          <a:p>
+            <a:pPr lvl="1"/>
+            <a:endParaRPr lang="en-US" dirty="0" smtClean="0"/>
+          </a:p>
+          <a:p>
+            <a:pPr lvl="1"/>
+            <a:endParaRPr lang="en-US" dirty="0"/>
           </a:p>
         </p:txBody>
       </p:sp>
@@ -3566,91 +3821,6 @@
         </p:nvSpPr>
         <p:spPr/>
         <p:txBody>
-          <a:bodyPr>
-            <a:normAutofit/>
-          </a:bodyPr>
-          <a:lstStyle/>
-          <a:p>
-            <a:r>
-              <a:rPr lang="en-US" dirty="0" smtClean="0"/>
-              <a:t>What is one thing we would change?</a:t>
-            </a:r>
-            <a:endParaRPr lang="en-US" dirty="0"/>
-          </a:p>
-        </p:txBody>
-      </p:sp>
-      <p:sp>
-        <p:nvSpPr>
-          <p:cNvPr id="3" name="Content Placeholder 2"/>
-          <p:cNvSpPr>
-            <a:spLocks noGrp="1"/>
-          </p:cNvSpPr>
-          <p:nvPr>
-            <p:ph idx="1"/>
-          </p:nvPr>
-        </p:nvSpPr>
-        <p:spPr/>
-        <p:txBody>
-          <a:bodyPr/>
-          <a:lstStyle/>
-          <a:p>
-            <a:r>
-              <a:rPr lang="en-US" sz="3200" dirty="0" smtClean="0"/>
-              <a:t>Focus on UI</a:t>
-            </a:r>
-          </a:p>
-          <a:p>
-            <a:pPr lvl="1"/>
-            <a:endParaRPr lang="en-US" dirty="0" smtClean="0"/>
-          </a:p>
-          <a:p>
-            <a:pPr lvl="1"/>
-            <a:endParaRPr lang="en-US" dirty="0"/>
-          </a:p>
-        </p:txBody>
-      </p:sp>
-    </p:spTree>
-    <p:extLst>
-      <p:ext uri="{BB962C8B-B14F-4D97-AF65-F5344CB8AC3E}">
-        <p14:creationId xmlns:p14="http://schemas.microsoft.com/office/powerpoint/2010/main" val="4271754826"/>
-      </p:ext>
-    </p:extLst>
-  </p:cSld>
-  <p:clrMapOvr>
-    <a:masterClrMapping/>
-  </p:clrMapOvr>
-</p:sld>
-</file>
-
-<file path=ppt/slides/slide12.xml><?xml version="1.0" encoding="utf-8"?>
-<p:sld xmlns:a="http://schemas.openxmlformats.org/drawingml/2006/main" xmlns:r="http://schemas.openxmlformats.org/officeDocument/2006/relationships" xmlns:p="http://schemas.openxmlformats.org/presentationml/2006/main">
-  <p:cSld>
-    <p:spTree>
-      <p:nvGrpSpPr>
-        <p:cNvPr id="1" name=""/>
-        <p:cNvGrpSpPr/>
-        <p:nvPr/>
-      </p:nvGrpSpPr>
-      <p:grpSpPr>
-        <a:xfrm>
-          <a:off x="0" y="0"/>
-          <a:ext cx="0" cy="0"/>
-          <a:chOff x="0" y="0"/>
-          <a:chExt cx="0" cy="0"/>
-        </a:xfrm>
-      </p:grpSpPr>
-      <p:sp>
-        <p:nvSpPr>
-          <p:cNvPr id="2" name="Title 1"/>
-          <p:cNvSpPr>
-            <a:spLocks noGrp="1"/>
-          </p:cNvSpPr>
-          <p:nvPr>
-            <p:ph type="title"/>
-          </p:nvPr>
-        </p:nvSpPr>
-        <p:spPr/>
-        <p:txBody>
           <a:bodyPr/>
           <a:lstStyle/>
           <a:p>
@@ -3708,6 +3878,9 @@
               <a:rPr lang="en-US" sz="3200" dirty="0" smtClean="0"/>
               <a:t>-</a:t>
             </a:r>
+          </a:p>
+          <a:p>
+            <a:endParaRPr lang="en-US" sz="3200" dirty="0" smtClean="0"/>
           </a:p>
           <a:p>
             <a:endParaRPr lang="en-US" sz="3200" dirty="0" smtClean="0"/>
@@ -3733,7 +3906,7 @@
 </p:sld>
 </file>
 
-<file path=ppt/slides/slide13.xml><?xml version="1.0" encoding="utf-8"?>
+<file path=ppt/slides/slide12.xml><?xml version="1.0" encoding="utf-8"?>
 <p:sld xmlns:a="http://schemas.openxmlformats.org/drawingml/2006/main" xmlns:r="http://schemas.openxmlformats.org/officeDocument/2006/relationships" xmlns:p="http://schemas.openxmlformats.org/presentationml/2006/main">
   <p:cSld>
     <p:spTree>
@@ -3976,7 +4149,7 @@
             <a:pPr lvl="1"/>
             <a:r>
               <a:rPr lang="en-US" sz="2800" dirty="0" smtClean="0"/>
-              <a:t>Hallo!</a:t>
+              <a:t>The HAL Interconnection Network(THIN)</a:t>
             </a:r>
           </a:p>
           <a:p>
@@ -4056,7 +4229,7 @@
           <a:p>
             <a:r>
               <a:rPr lang="en-US" dirty="0" smtClean="0"/>
-              <a:t>Hallo!</a:t>
+              <a:t>T.H.I.N.</a:t>
             </a:r>
             <a:endParaRPr lang="en-US" dirty="0"/>
           </a:p>
@@ -4646,6 +4819,10 @@
           <a:bodyPr/>
           <a:lstStyle/>
           <a:p>
+            <a:r>
+              <a:rPr lang="en-US" dirty="0" smtClean="0"/>
+              <a:t>Commits </a:t>
+            </a:r>
             <a:endParaRPr lang="en-US" dirty="0"/>
           </a:p>
         </p:txBody>

</xml_diff>

<commit_message>
made changes to Ryan's part of the presentation powerpoint
</commit_message>
<xml_diff>
--- a/doc/phase4/Mac reflection presentation.pptx
+++ b/doc/phase4/Mac reflection presentation.pptx
@@ -1,6 +1,6 @@
 
 <file path=ppt/presentation.xml><?xml version="1.0" encoding="utf-8"?>
-<p:presentation xmlns:a="http://schemas.openxmlformats.org/drawingml/2006/main" xmlns:r="http://schemas.openxmlformats.org/officeDocument/2006/relationships" xmlns:p="http://schemas.openxmlformats.org/presentationml/2006/main" saveSubsetFonts="1">
+<p:presentation xmlns:a="http://schemas.openxmlformats.org/drawingml/2006/main" xmlns:r="http://schemas.openxmlformats.org/officeDocument/2006/relationships" xmlns:mc="http://schemas.openxmlformats.org/markup-compatibility/2006" xmlns:mv="urn:schemas-microsoft-com:mac:vml" xmlns:p="http://schemas.openxmlformats.org/presentationml/2006/main" mc:Ignorable="mv" mc:PreserveAttributes="mv:*" saveSubsetFonts="1">
   <p:sldMasterIdLst>
     <p:sldMasterId id="2147483756" r:id="rId1"/>
   </p:sldMasterIdLst>
@@ -9,16 +9,18 @@
     <p:sldId id="258" r:id="rId3"/>
     <p:sldId id="259" r:id="rId4"/>
     <p:sldId id="260" r:id="rId5"/>
-    <p:sldId id="261" r:id="rId6"/>
-    <p:sldId id="268" r:id="rId7"/>
-    <p:sldId id="262" r:id="rId8"/>
-    <p:sldId id="263" r:id="rId9"/>
-    <p:sldId id="270" r:id="rId10"/>
-    <p:sldId id="271" r:id="rId11"/>
-    <p:sldId id="272" r:id="rId12"/>
-    <p:sldId id="264" r:id="rId13"/>
-    <p:sldId id="266" r:id="rId14"/>
-    <p:sldId id="267" r:id="rId15"/>
+    <p:sldId id="273" r:id="rId6"/>
+    <p:sldId id="274" r:id="rId7"/>
+    <p:sldId id="261" r:id="rId8"/>
+    <p:sldId id="268" r:id="rId9"/>
+    <p:sldId id="262" r:id="rId10"/>
+    <p:sldId id="263" r:id="rId11"/>
+    <p:sldId id="270" r:id="rId12"/>
+    <p:sldId id="271" r:id="rId13"/>
+    <p:sldId id="272" r:id="rId14"/>
+    <p:sldId id="264" r:id="rId15"/>
+    <p:sldId id="266" r:id="rId16"/>
+    <p:sldId id="267" r:id="rId17"/>
   </p:sldIdLst>
   <p:sldSz cx="9144000" cy="6858000" type="screen4x3"/>
   <p:notesSz cx="6858000" cy="9144000"/>
@@ -121,7 +123,7 @@
 </file>
 
 <file path=ppt/slideLayouts/slideLayout1.xml><?xml version="1.0" encoding="utf-8"?>
-<p:sldLayout xmlns:a="http://schemas.openxmlformats.org/drawingml/2006/main" xmlns:r="http://schemas.openxmlformats.org/officeDocument/2006/relationships" xmlns:p="http://schemas.openxmlformats.org/presentationml/2006/main" type="title" preserve="1">
+<p:sldLayout xmlns:a="http://schemas.openxmlformats.org/drawingml/2006/main" xmlns:r="http://schemas.openxmlformats.org/officeDocument/2006/relationships" xmlns:mc="http://schemas.openxmlformats.org/markup-compatibility/2006" xmlns:mv="urn:schemas-microsoft-com:mac:vml" xmlns:p="http://schemas.openxmlformats.org/presentationml/2006/main" mc:Ignorable="mv" mc:PreserveAttributes="mv:*" type="title" preserve="1">
   <p:cSld name="Title Slide">
     <p:spTree>
       <p:nvGrpSpPr>
@@ -308,7 +310,8 @@
           <a:p>
             <a:fld id="{DA465DD8-BC04-4F6B-A531-47C678A40F86}" type="datetimeFigureOut">
               <a:rPr lang="en-US" smtClean="0"/>
-              <a:t>12/8/2013</a:t>
+              <a:pPr/>
+              <a:t>12/9/13</a:t>
             </a:fld>
             <a:endParaRPr lang="en-US"/>
           </a:p>
@@ -350,6 +353,7 @@
           <a:p>
             <a:fld id="{ED194F4F-4EC5-4FDC-AE7D-8445F49E46BF}" type="slidenum">
               <a:rPr lang="en-US" smtClean="0"/>
+              <a:pPr/>
               <a:t>‹#›</a:t>
             </a:fld>
             <a:endParaRPr lang="en-US"/>
@@ -400,7 +404,7 @@
 </file>
 
 <file path=ppt/slideLayouts/slideLayout10.xml><?xml version="1.0" encoding="utf-8"?>
-<p:sldLayout xmlns:a="http://schemas.openxmlformats.org/drawingml/2006/main" xmlns:r="http://schemas.openxmlformats.org/officeDocument/2006/relationships" xmlns:p="http://schemas.openxmlformats.org/presentationml/2006/main" type="vertTx" preserve="1">
+<p:sldLayout xmlns:a="http://schemas.openxmlformats.org/drawingml/2006/main" xmlns:r="http://schemas.openxmlformats.org/officeDocument/2006/relationships" xmlns:mc="http://schemas.openxmlformats.org/markup-compatibility/2006" xmlns:mv="urn:schemas-microsoft-com:mac:vml" xmlns:p="http://schemas.openxmlformats.org/presentationml/2006/main" mc:Ignorable="mv" mc:PreserveAttributes="mv:*" type="vertTx" preserve="1">
   <p:cSld name="Title and Vertical Text">
     <p:spTree>
       <p:nvGrpSpPr>
@@ -508,7 +512,8 @@
           <a:p>
             <a:fld id="{DA465DD8-BC04-4F6B-A531-47C678A40F86}" type="datetimeFigureOut">
               <a:rPr lang="en-US" smtClean="0"/>
-              <a:t>12/8/2013</a:t>
+              <a:pPr/>
+              <a:t>12/9/13</a:t>
             </a:fld>
             <a:endParaRPr lang="en-US"/>
           </a:p>
@@ -550,6 +555,7 @@
           <a:p>
             <a:fld id="{ED194F4F-4EC5-4FDC-AE7D-8445F49E46BF}" type="slidenum">
               <a:rPr lang="en-US" smtClean="0"/>
+              <a:pPr/>
               <a:t>‹#›</a:t>
             </a:fld>
             <a:endParaRPr lang="en-US"/>
@@ -565,7 +571,7 @@
 </file>
 
 <file path=ppt/slideLayouts/slideLayout11.xml><?xml version="1.0" encoding="utf-8"?>
-<p:sldLayout xmlns:a="http://schemas.openxmlformats.org/drawingml/2006/main" xmlns:r="http://schemas.openxmlformats.org/officeDocument/2006/relationships" xmlns:p="http://schemas.openxmlformats.org/presentationml/2006/main" type="vertTitleAndTx" preserve="1">
+<p:sldLayout xmlns:a="http://schemas.openxmlformats.org/drawingml/2006/main" xmlns:r="http://schemas.openxmlformats.org/officeDocument/2006/relationships" xmlns:mc="http://schemas.openxmlformats.org/markup-compatibility/2006" xmlns:mv="urn:schemas-microsoft-com:mac:vml" xmlns:p="http://schemas.openxmlformats.org/presentationml/2006/main" mc:Ignorable="mv" mc:PreserveAttributes="mv:*" type="vertTitleAndTx" preserve="1">
   <p:cSld name="Vertical Title and Text">
     <p:spTree>
       <p:nvGrpSpPr>
@@ -683,7 +689,8 @@
           <a:p>
             <a:fld id="{DA465DD8-BC04-4F6B-A531-47C678A40F86}" type="datetimeFigureOut">
               <a:rPr lang="en-US" smtClean="0"/>
-              <a:t>12/8/2013</a:t>
+              <a:pPr/>
+              <a:t>12/9/13</a:t>
             </a:fld>
             <a:endParaRPr lang="en-US"/>
           </a:p>
@@ -725,6 +732,7 @@
           <a:p>
             <a:fld id="{ED194F4F-4EC5-4FDC-AE7D-8445F49E46BF}" type="slidenum">
               <a:rPr lang="en-US" smtClean="0"/>
+              <a:pPr/>
               <a:t>‹#›</a:t>
             </a:fld>
             <a:endParaRPr lang="en-US"/>
@@ -740,7 +748,7 @@
 </file>
 
 <file path=ppt/slideLayouts/slideLayout2.xml><?xml version="1.0" encoding="utf-8"?>
-<p:sldLayout xmlns:a="http://schemas.openxmlformats.org/drawingml/2006/main" xmlns:r="http://schemas.openxmlformats.org/officeDocument/2006/relationships" xmlns:p="http://schemas.openxmlformats.org/presentationml/2006/main" type="obj" preserve="1">
+<p:sldLayout xmlns:a="http://schemas.openxmlformats.org/drawingml/2006/main" xmlns:r="http://schemas.openxmlformats.org/officeDocument/2006/relationships" xmlns:mc="http://schemas.openxmlformats.org/markup-compatibility/2006" xmlns:mv="urn:schemas-microsoft-com:mac:vml" xmlns:p="http://schemas.openxmlformats.org/presentationml/2006/main" mc:Ignorable="mv" mc:PreserveAttributes="mv:*" type="obj" preserve="1">
   <p:cSld name="Title and Content">
     <p:spTree>
       <p:nvGrpSpPr>
@@ -848,7 +856,8 @@
           <a:p>
             <a:fld id="{DA465DD8-BC04-4F6B-A531-47C678A40F86}" type="datetimeFigureOut">
               <a:rPr lang="en-US" smtClean="0"/>
-              <a:t>12/8/2013</a:t>
+              <a:pPr/>
+              <a:t>12/9/13</a:t>
             </a:fld>
             <a:endParaRPr lang="en-US"/>
           </a:p>
@@ -890,6 +899,7 @@
           <a:p>
             <a:fld id="{ED194F4F-4EC5-4FDC-AE7D-8445F49E46BF}" type="slidenum">
               <a:rPr lang="en-US" smtClean="0"/>
+              <a:pPr/>
               <a:t>‹#›</a:t>
             </a:fld>
             <a:endParaRPr lang="en-US"/>
@@ -905,7 +915,7 @@
 </file>
 
 <file path=ppt/slideLayouts/slideLayout3.xml><?xml version="1.0" encoding="utf-8"?>
-<p:sldLayout xmlns:a="http://schemas.openxmlformats.org/drawingml/2006/main" xmlns:r="http://schemas.openxmlformats.org/officeDocument/2006/relationships" xmlns:p="http://schemas.openxmlformats.org/presentationml/2006/main" type="secHead" preserve="1">
+<p:sldLayout xmlns:a="http://schemas.openxmlformats.org/drawingml/2006/main" xmlns:r="http://schemas.openxmlformats.org/officeDocument/2006/relationships" xmlns:mc="http://schemas.openxmlformats.org/markup-compatibility/2006" xmlns:mv="urn:schemas-microsoft-com:mac:vml" xmlns:p="http://schemas.openxmlformats.org/presentationml/2006/main" mc:Ignorable="mv" mc:PreserveAttributes="mv:*" type="secHead" preserve="1">
   <p:cSld name="Section Header">
     <p:spTree>
       <p:nvGrpSpPr>
@@ -1091,7 +1101,8 @@
           <a:p>
             <a:fld id="{DA465DD8-BC04-4F6B-A531-47C678A40F86}" type="datetimeFigureOut">
               <a:rPr lang="en-US" smtClean="0"/>
-              <a:t>12/8/2013</a:t>
+              <a:pPr/>
+              <a:t>12/9/13</a:t>
             </a:fld>
             <a:endParaRPr lang="en-US"/>
           </a:p>
@@ -1133,6 +1144,7 @@
           <a:p>
             <a:fld id="{ED194F4F-4EC5-4FDC-AE7D-8445F49E46BF}" type="slidenum">
               <a:rPr lang="en-US" smtClean="0"/>
+              <a:pPr/>
               <a:t>‹#›</a:t>
             </a:fld>
             <a:endParaRPr lang="en-US"/>
@@ -1183,7 +1195,7 @@
 </file>
 
 <file path=ppt/slideLayouts/slideLayout4.xml><?xml version="1.0" encoding="utf-8"?>
-<p:sldLayout xmlns:a="http://schemas.openxmlformats.org/drawingml/2006/main" xmlns:r="http://schemas.openxmlformats.org/officeDocument/2006/relationships" xmlns:p="http://schemas.openxmlformats.org/presentationml/2006/main" type="twoObj" preserve="1">
+<p:sldLayout xmlns:a="http://schemas.openxmlformats.org/drawingml/2006/main" xmlns:r="http://schemas.openxmlformats.org/officeDocument/2006/relationships" xmlns:mc="http://schemas.openxmlformats.org/markup-compatibility/2006" xmlns:mv="urn:schemas-microsoft-com:mac:vml" xmlns:p="http://schemas.openxmlformats.org/presentationml/2006/main" mc:Ignorable="mv" mc:PreserveAttributes="mv:*" type="twoObj" preserve="1">
   <p:cSld name="Two Content">
     <p:spTree>
       <p:nvGrpSpPr>
@@ -1409,7 +1421,8 @@
           <a:p>
             <a:fld id="{DA465DD8-BC04-4F6B-A531-47C678A40F86}" type="datetimeFigureOut">
               <a:rPr lang="en-US" smtClean="0"/>
-              <a:t>12/8/2013</a:t>
+              <a:pPr/>
+              <a:t>12/9/13</a:t>
             </a:fld>
             <a:endParaRPr lang="en-US"/>
           </a:p>
@@ -1451,6 +1464,7 @@
           <a:p>
             <a:fld id="{ED194F4F-4EC5-4FDC-AE7D-8445F49E46BF}" type="slidenum">
               <a:rPr lang="en-US" smtClean="0"/>
+              <a:pPr/>
               <a:t>‹#›</a:t>
             </a:fld>
             <a:endParaRPr lang="en-US"/>
@@ -1466,7 +1480,7 @@
 </file>
 
 <file path=ppt/slideLayouts/slideLayout5.xml><?xml version="1.0" encoding="utf-8"?>
-<p:sldLayout xmlns:a="http://schemas.openxmlformats.org/drawingml/2006/main" xmlns:r="http://schemas.openxmlformats.org/officeDocument/2006/relationships" xmlns:p="http://schemas.openxmlformats.org/presentationml/2006/main" type="twoTxTwoObj" preserve="1">
+<p:sldLayout xmlns:a="http://schemas.openxmlformats.org/drawingml/2006/main" xmlns:r="http://schemas.openxmlformats.org/officeDocument/2006/relationships" xmlns:mc="http://schemas.openxmlformats.org/markup-compatibility/2006" xmlns:mv="urn:schemas-microsoft-com:mac:vml" xmlns:p="http://schemas.openxmlformats.org/presentationml/2006/main" mc:Ignorable="mv" mc:PreserveAttributes="mv:*" type="twoTxTwoObj" preserve="1">
   <p:cSld name="Comparison">
     <p:spTree>
       <p:nvGrpSpPr>
@@ -1875,7 +1889,8 @@
           <a:p>
             <a:fld id="{DA465DD8-BC04-4F6B-A531-47C678A40F86}" type="datetimeFigureOut">
               <a:rPr lang="en-US" smtClean="0"/>
-              <a:t>12/8/2013</a:t>
+              <a:pPr/>
+              <a:t>12/9/13</a:t>
             </a:fld>
             <a:endParaRPr lang="en-US"/>
           </a:p>
@@ -1917,6 +1932,7 @@
           <a:p>
             <a:fld id="{ED194F4F-4EC5-4FDC-AE7D-8445F49E46BF}" type="slidenum">
               <a:rPr lang="en-US" smtClean="0"/>
+              <a:pPr/>
               <a:t>‹#›</a:t>
             </a:fld>
             <a:endParaRPr lang="en-US"/>
@@ -1967,7 +1983,7 @@
 </file>
 
 <file path=ppt/slideLayouts/slideLayout6.xml><?xml version="1.0" encoding="utf-8"?>
-<p:sldLayout xmlns:a="http://schemas.openxmlformats.org/drawingml/2006/main" xmlns:r="http://schemas.openxmlformats.org/officeDocument/2006/relationships" xmlns:p="http://schemas.openxmlformats.org/presentationml/2006/main" type="titleOnly" preserve="1">
+<p:sldLayout xmlns:a="http://schemas.openxmlformats.org/drawingml/2006/main" xmlns:r="http://schemas.openxmlformats.org/officeDocument/2006/relationships" xmlns:mc="http://schemas.openxmlformats.org/markup-compatibility/2006" xmlns:mv="urn:schemas-microsoft-com:mac:vml" xmlns:p="http://schemas.openxmlformats.org/presentationml/2006/main" mc:Ignorable="mv" mc:PreserveAttributes="mv:*" type="titleOnly" preserve="1">
   <p:cSld name="Title Only">
     <p:spTree>
       <p:nvGrpSpPr>
@@ -2023,7 +2039,8 @@
           <a:p>
             <a:fld id="{DA465DD8-BC04-4F6B-A531-47C678A40F86}" type="datetimeFigureOut">
               <a:rPr lang="en-US" smtClean="0"/>
-              <a:t>12/8/2013</a:t>
+              <a:pPr/>
+              <a:t>12/9/13</a:t>
             </a:fld>
             <a:endParaRPr lang="en-US"/>
           </a:p>
@@ -2065,6 +2082,7 @@
           <a:p>
             <a:fld id="{ED194F4F-4EC5-4FDC-AE7D-8445F49E46BF}" type="slidenum">
               <a:rPr lang="en-US" smtClean="0"/>
+              <a:pPr/>
               <a:t>‹#›</a:t>
             </a:fld>
             <a:endParaRPr lang="en-US"/>
@@ -2080,7 +2098,7 @@
 </file>
 
 <file path=ppt/slideLayouts/slideLayout7.xml><?xml version="1.0" encoding="utf-8"?>
-<p:sldLayout xmlns:a="http://schemas.openxmlformats.org/drawingml/2006/main" xmlns:r="http://schemas.openxmlformats.org/officeDocument/2006/relationships" xmlns:p="http://schemas.openxmlformats.org/presentationml/2006/main" type="blank" preserve="1">
+<p:sldLayout xmlns:a="http://schemas.openxmlformats.org/drawingml/2006/main" xmlns:r="http://schemas.openxmlformats.org/officeDocument/2006/relationships" xmlns:mc="http://schemas.openxmlformats.org/markup-compatibility/2006" xmlns:mv="urn:schemas-microsoft-com:mac:vml" xmlns:p="http://schemas.openxmlformats.org/presentationml/2006/main" mc:Ignorable="mv" mc:PreserveAttributes="mv:*" type="blank" preserve="1">
   <p:cSld name="Blank">
     <p:spTree>
       <p:nvGrpSpPr>
@@ -2113,7 +2131,8 @@
           <a:p>
             <a:fld id="{DA465DD8-BC04-4F6B-A531-47C678A40F86}" type="datetimeFigureOut">
               <a:rPr lang="en-US" smtClean="0"/>
-              <a:t>12/8/2013</a:t>
+              <a:pPr/>
+              <a:t>12/9/13</a:t>
             </a:fld>
             <a:endParaRPr lang="en-US"/>
           </a:p>
@@ -2155,6 +2174,7 @@
           <a:p>
             <a:fld id="{ED194F4F-4EC5-4FDC-AE7D-8445F49E46BF}" type="slidenum">
               <a:rPr lang="en-US" smtClean="0"/>
+              <a:pPr/>
               <a:t>‹#›</a:t>
             </a:fld>
             <a:endParaRPr lang="en-US"/>
@@ -2170,7 +2190,7 @@
 </file>
 
 <file path=ppt/slideLayouts/slideLayout8.xml><?xml version="1.0" encoding="utf-8"?>
-<p:sldLayout xmlns:a="http://schemas.openxmlformats.org/drawingml/2006/main" xmlns:r="http://schemas.openxmlformats.org/officeDocument/2006/relationships" xmlns:p="http://schemas.openxmlformats.org/presentationml/2006/main" type="objTx" preserve="1">
+<p:sldLayout xmlns:a="http://schemas.openxmlformats.org/drawingml/2006/main" xmlns:r="http://schemas.openxmlformats.org/officeDocument/2006/relationships" xmlns:mc="http://schemas.openxmlformats.org/markup-compatibility/2006" xmlns:mv="urn:schemas-microsoft-com:mac:vml" xmlns:p="http://schemas.openxmlformats.org/presentationml/2006/main" mc:Ignorable="mv" mc:PreserveAttributes="mv:*" type="objTx" preserve="1">
   <p:cSld name="Content with Caption">
     <p:spTree>
       <p:nvGrpSpPr>
@@ -2387,7 +2407,8 @@
           <a:p>
             <a:fld id="{DA465DD8-BC04-4F6B-A531-47C678A40F86}" type="datetimeFigureOut">
               <a:rPr lang="en-US" smtClean="0"/>
-              <a:t>12/8/2013</a:t>
+              <a:pPr/>
+              <a:t>12/9/13</a:t>
             </a:fld>
             <a:endParaRPr lang="en-US"/>
           </a:p>
@@ -2429,6 +2450,7 @@
           <a:p>
             <a:fld id="{ED194F4F-4EC5-4FDC-AE7D-8445F49E46BF}" type="slidenum">
               <a:rPr lang="en-US" smtClean="0"/>
+              <a:pPr/>
               <a:t>‹#›</a:t>
             </a:fld>
             <a:endParaRPr lang="en-US"/>
@@ -2479,7 +2501,7 @@
 </file>
 
 <file path=ppt/slideLayouts/slideLayout9.xml><?xml version="1.0" encoding="utf-8"?>
-<p:sldLayout xmlns:a="http://schemas.openxmlformats.org/drawingml/2006/main" xmlns:r="http://schemas.openxmlformats.org/officeDocument/2006/relationships" xmlns:p="http://schemas.openxmlformats.org/presentationml/2006/main" type="picTx" preserve="1">
+<p:sldLayout xmlns:a="http://schemas.openxmlformats.org/drawingml/2006/main" xmlns:r="http://schemas.openxmlformats.org/officeDocument/2006/relationships" xmlns:mc="http://schemas.openxmlformats.org/markup-compatibility/2006" xmlns:mv="urn:schemas-microsoft-com:mac:vml" xmlns:p="http://schemas.openxmlformats.org/presentationml/2006/main" mc:Ignorable="mv" mc:PreserveAttributes="mv:*" type="picTx" preserve="1">
   <p:cSld name="Picture with Caption">
     <p:spTree>
       <p:nvGrpSpPr>
@@ -2692,7 +2714,8 @@
           <a:p>
             <a:fld id="{DA465DD8-BC04-4F6B-A531-47C678A40F86}" type="datetimeFigureOut">
               <a:rPr lang="en-US" smtClean="0"/>
-              <a:t>12/8/2013</a:t>
+              <a:pPr/>
+              <a:t>12/9/13</a:t>
             </a:fld>
             <a:endParaRPr lang="en-US"/>
           </a:p>
@@ -2734,6 +2757,7 @@
           <a:p>
             <a:fld id="{ED194F4F-4EC5-4FDC-AE7D-8445F49E46BF}" type="slidenum">
               <a:rPr lang="en-US" smtClean="0"/>
+              <a:pPr/>
               <a:t>‹#›</a:t>
             </a:fld>
             <a:endParaRPr lang="en-US"/>
@@ -2749,7 +2773,7 @@
 </file>
 
 <file path=ppt/slideMasters/slideMaster1.xml><?xml version="1.0" encoding="utf-8"?>
-<p:sldMaster xmlns:a="http://schemas.openxmlformats.org/drawingml/2006/main" xmlns:r="http://schemas.openxmlformats.org/officeDocument/2006/relationships" xmlns:p="http://schemas.openxmlformats.org/presentationml/2006/main">
+<p:sldMaster xmlns:a="http://schemas.openxmlformats.org/drawingml/2006/main" xmlns:r="http://schemas.openxmlformats.org/officeDocument/2006/relationships" xmlns:mc="http://schemas.openxmlformats.org/markup-compatibility/2006" xmlns:mv="urn:schemas-microsoft-com:mac:vml" xmlns:p="http://schemas.openxmlformats.org/presentationml/2006/main" mc:Ignorable="mv" mc:PreserveAttributes="mv:*">
   <p:cSld>
     <p:bg>
       <p:bgRef idx="1002">
@@ -2990,7 +3014,8 @@
           <a:p>
             <a:fld id="{DA465DD8-BC04-4F6B-A531-47C678A40F86}" type="datetimeFigureOut">
               <a:rPr lang="en-US" smtClean="0"/>
-              <a:t>12/8/2013</a:t>
+              <a:pPr/>
+              <a:t>12/9/13</a:t>
             </a:fld>
             <a:endParaRPr lang="en-US"/>
           </a:p>
@@ -3064,6 +3089,7 @@
           <a:p>
             <a:fld id="{ED194F4F-4EC5-4FDC-AE7D-8445F49E46BF}" type="slidenum">
               <a:rPr lang="en-US" smtClean="0"/>
+              <a:pPr/>
               <a:t>‹#›</a:t>
             </a:fld>
             <a:endParaRPr lang="en-US"/>
@@ -3371,7 +3397,7 @@
 </file>
 
 <file path=ppt/slides/slide1.xml><?xml version="1.0" encoding="utf-8"?>
-<p:sld xmlns:a="http://schemas.openxmlformats.org/drawingml/2006/main" xmlns:r="http://schemas.openxmlformats.org/officeDocument/2006/relationships" xmlns:p="http://schemas.openxmlformats.org/presentationml/2006/main">
+<p:sld xmlns:a="http://schemas.openxmlformats.org/drawingml/2006/main" xmlns:r="http://schemas.openxmlformats.org/officeDocument/2006/relationships" xmlns:mc="http://schemas.openxmlformats.org/markup-compatibility/2006" xmlns:mv="urn:schemas-microsoft-com:mac:vml" xmlns:p="http://schemas.openxmlformats.org/presentationml/2006/main" mc:Ignorable="mv" mc:PreserveAttributes="mv:*">
   <p:cSld>
     <p:spTree>
       <p:nvGrpSpPr>
@@ -3436,7 +3462,7 @@
     </p:spTree>
     <p:extLst>
       <p:ext uri="{BB962C8B-B14F-4D97-AF65-F5344CB8AC3E}">
-        <p14:creationId xmlns:p14="http://schemas.microsoft.com/office/powerpoint/2010/main" val="1929189967"/>
+        <p14:creationId xmlns:p14="http://schemas.microsoft.com/office/powerpoint/2010/main" xmlns:p="http://schemas.openxmlformats.org/presentationml/2006/main" xmlns:r="http://schemas.openxmlformats.org/officeDocument/2006/relationships" xmlns:a="http://schemas.openxmlformats.org/drawingml/2006/main" xmlns="" val="1929189967"/>
       </p:ext>
     </p:extLst>
   </p:cSld>
@@ -3447,7 +3473,305 @@
 </file>
 
 <file path=ppt/slides/slide10.xml><?xml version="1.0" encoding="utf-8"?>
-<p:sld xmlns:a="http://schemas.openxmlformats.org/drawingml/2006/main" xmlns:r="http://schemas.openxmlformats.org/officeDocument/2006/relationships" xmlns:p="http://schemas.openxmlformats.org/presentationml/2006/main">
+<p:sld xmlns:a="http://schemas.openxmlformats.org/drawingml/2006/main" xmlns:r="http://schemas.openxmlformats.org/officeDocument/2006/relationships" xmlns:mc="http://schemas.openxmlformats.org/markup-compatibility/2006" xmlns:mv="urn:schemas-microsoft-com:mac:vml" xmlns:p="http://schemas.openxmlformats.org/presentationml/2006/main" mc:Ignorable="mv" mc:PreserveAttributes="mv:*">
+  <p:cSld>
+    <p:spTree>
+      <p:nvGrpSpPr>
+        <p:cNvPr id="1" name=""/>
+        <p:cNvGrpSpPr/>
+        <p:nvPr/>
+      </p:nvGrpSpPr>
+      <p:grpSpPr>
+        <a:xfrm>
+          <a:off x="0" y="0"/>
+          <a:ext cx="0" cy="0"/>
+          <a:chOff x="0" y="0"/>
+          <a:chExt cx="0" cy="0"/>
+        </a:xfrm>
+      </p:grpSpPr>
+      <p:sp>
+        <p:nvSpPr>
+          <p:cNvPr id="2" name="Title 1"/>
+          <p:cNvSpPr>
+            <a:spLocks noGrp="1"/>
+          </p:cNvSpPr>
+          <p:nvPr>
+            <p:ph type="title"/>
+          </p:nvPr>
+        </p:nvSpPr>
+        <p:spPr/>
+        <p:txBody>
+          <a:bodyPr/>
+          <a:lstStyle/>
+          <a:p>
+            <a:r>
+              <a:rPr lang="en-US" dirty="0" smtClean="0"/>
+              <a:t>What did we learn?</a:t>
+            </a:r>
+            <a:endParaRPr lang="en-US" dirty="0"/>
+          </a:p>
+        </p:txBody>
+      </p:sp>
+      <p:sp>
+        <p:nvSpPr>
+          <p:cNvPr id="3" name="Content Placeholder 2"/>
+          <p:cNvSpPr>
+            <a:spLocks noGrp="1"/>
+          </p:cNvSpPr>
+          <p:nvPr>
+            <p:ph idx="1"/>
+          </p:nvPr>
+        </p:nvSpPr>
+        <p:spPr/>
+        <p:txBody>
+          <a:bodyPr/>
+          <a:lstStyle/>
+          <a:p>
+            <a:r>
+              <a:rPr lang="en-US" sz="3200" dirty="0" smtClean="0"/>
+              <a:t>Crash course in web development</a:t>
+            </a:r>
+          </a:p>
+          <a:p>
+            <a:r>
+              <a:rPr lang="en-US" sz="3200" dirty="0" smtClean="0"/>
+              <a:t>Teammate Problems</a:t>
+            </a:r>
+          </a:p>
+          <a:p>
+            <a:pPr lvl="1"/>
+            <a:r>
+              <a:rPr lang="en-US" sz="2800" dirty="0" smtClean="0"/>
+              <a:t>1 member was dropped</a:t>
+            </a:r>
+          </a:p>
+          <a:p>
+            <a:r>
+              <a:rPr lang="en-US" sz="3200" dirty="0" smtClean="0"/>
+              <a:t>Division of Labor</a:t>
+            </a:r>
+          </a:p>
+          <a:p>
+            <a:r>
+              <a:rPr lang="en-US" sz="3200" dirty="0" smtClean="0"/>
+              <a:t>Internal vs. External Deadlines</a:t>
+            </a:r>
+          </a:p>
+          <a:p>
+            <a:endParaRPr lang="en-US" sz="3200" dirty="0" smtClean="0"/>
+          </a:p>
+          <a:p>
+            <a:endParaRPr lang="en-US" sz="3200" dirty="0" smtClean="0"/>
+          </a:p>
+          <a:p>
+            <a:pPr lvl="1"/>
+            <a:endParaRPr lang="en-US" sz="2800" dirty="0" smtClean="0"/>
+          </a:p>
+          <a:p>
+            <a:endParaRPr lang="en-US" sz="3200" dirty="0"/>
+          </a:p>
+          <a:p>
+            <a:endParaRPr lang="en-US" sz="3200" dirty="0" smtClean="0"/>
+          </a:p>
+          <a:p>
+            <a:endParaRPr lang="en-US" sz="3200" dirty="0" smtClean="0"/>
+          </a:p>
+          <a:p>
+            <a:endParaRPr lang="en-US" sz="3200" dirty="0" smtClean="0"/>
+          </a:p>
+          <a:p>
+            <a:endParaRPr lang="en-US" dirty="0"/>
+          </a:p>
+        </p:txBody>
+      </p:sp>
+    </p:spTree>
+    <p:extLst>
+      <p:ext uri="{BB962C8B-B14F-4D97-AF65-F5344CB8AC3E}">
+        <p14:creationId xmlns:p14="http://schemas.microsoft.com/office/powerpoint/2010/main" xmlns:p="http://schemas.openxmlformats.org/presentationml/2006/main" xmlns:r="http://schemas.openxmlformats.org/officeDocument/2006/relationships" xmlns:a="http://schemas.openxmlformats.org/drawingml/2006/main" xmlns="" val="85277640"/>
+      </p:ext>
+    </p:extLst>
+  </p:cSld>
+  <p:clrMapOvr>
+    <a:masterClrMapping/>
+  </p:clrMapOvr>
+</p:sld>
+</file>
+
+<file path=ppt/slides/slide11.xml><?xml version="1.0" encoding="utf-8"?>
+<p:sld xmlns:a="http://schemas.openxmlformats.org/drawingml/2006/main" xmlns:r="http://schemas.openxmlformats.org/officeDocument/2006/relationships" xmlns:mc="http://schemas.openxmlformats.org/markup-compatibility/2006" xmlns:mv="urn:schemas-microsoft-com:mac:vml" xmlns:p="http://schemas.openxmlformats.org/presentationml/2006/main" mc:Ignorable="mv" mc:PreserveAttributes="mv:*">
+  <p:cSld>
+    <p:spTree>
+      <p:nvGrpSpPr>
+        <p:cNvPr id="1" name=""/>
+        <p:cNvGrpSpPr/>
+        <p:nvPr/>
+      </p:nvGrpSpPr>
+      <p:grpSpPr>
+        <a:xfrm>
+          <a:off x="0" y="0"/>
+          <a:ext cx="0" cy="0"/>
+          <a:chOff x="0" y="0"/>
+          <a:chExt cx="0" cy="0"/>
+        </a:xfrm>
+      </p:grpSpPr>
+      <p:sp>
+        <p:nvSpPr>
+          <p:cNvPr id="2" name="Title 1"/>
+          <p:cNvSpPr>
+            <a:spLocks noGrp="1"/>
+          </p:cNvSpPr>
+          <p:nvPr>
+            <p:ph type="title"/>
+          </p:nvPr>
+        </p:nvSpPr>
+        <p:spPr/>
+        <p:txBody>
+          <a:bodyPr/>
+          <a:lstStyle/>
+          <a:p>
+            <a:r>
+              <a:rPr lang="en-US" dirty="0" smtClean="0"/>
+              <a:t>Commits </a:t>
+            </a:r>
+            <a:endParaRPr lang="en-US" dirty="0"/>
+          </a:p>
+        </p:txBody>
+      </p:sp>
+      <p:pic>
+        <p:nvPicPr>
+          <p:cNvPr id="4" name="Content Placeholder 3"/>
+          <p:cNvPicPr>
+            <a:picLocks noGrp="1" noChangeAspect="1"/>
+          </p:cNvPicPr>
+          <p:nvPr>
+            <p:ph idx="1"/>
+          </p:nvPr>
+        </p:nvPicPr>
+        <p:blipFill>
+          <a:blip r:embed="rId2">
+            <a:extLst>
+              <a:ext uri="{28A0092B-C50C-407E-A947-70E740481C1C}">
+                <a14:useLocalDpi xmlns:a14="http://schemas.microsoft.com/office/drawing/2010/main" xmlns:p="http://schemas.openxmlformats.org/presentationml/2006/main" xmlns:r="http://schemas.openxmlformats.org/officeDocument/2006/relationships" xmlns:a="http://schemas.openxmlformats.org/drawingml/2006/main" xmlns="" val="0"/>
+              </a:ext>
+            </a:extLst>
+          </a:blip>
+          <a:stretch>
+            <a:fillRect/>
+          </a:stretch>
+        </p:blipFill>
+        <p:spPr>
+          <a:xfrm>
+            <a:off x="0" y="3581400"/>
+            <a:ext cx="9175280" cy="3276600"/>
+          </a:xfrm>
+        </p:spPr>
+      </p:pic>
+      <p:sp>
+        <p:nvSpPr>
+          <p:cNvPr id="5" name="TextBox 4"/>
+          <p:cNvSpPr txBox="1"/>
+          <p:nvPr/>
+        </p:nvSpPr>
+        <p:spPr>
+          <a:xfrm>
+            <a:off x="422564" y="1752600"/>
+            <a:ext cx="8188036" cy="1846659"/>
+          </a:xfrm>
+          <a:prstGeom prst="rect">
+            <a:avLst/>
+          </a:prstGeom>
+          <a:noFill/>
+        </p:spPr>
+        <p:txBody>
+          <a:bodyPr wrap="square" rtlCol="0">
+            <a:spAutoFit/>
+          </a:bodyPr>
+          <a:lstStyle/>
+          <a:p>
+            <a:r>
+              <a:rPr lang="da-DK" sz="2400" b="1" dirty="0" smtClean="0"/>
+              <a:t>November 08 2013 - December 08 2013:</a:t>
+            </a:r>
+            <a:endParaRPr lang="en-US" sz="2400" b="1" dirty="0" smtClean="0"/>
+          </a:p>
+          <a:p>
+            <a:r>
+              <a:rPr lang="en-US" sz="2400" b="1" dirty="0" smtClean="0"/>
+              <a:t>3 authors</a:t>
+            </a:r>
+            <a:r>
+              <a:rPr lang="en-US" sz="2400" dirty="0" smtClean="0"/>
+              <a:t> have pushed </a:t>
+            </a:r>
+            <a:r>
+              <a:rPr lang="en-US" sz="2400" b="1" dirty="0" smtClean="0"/>
+              <a:t>55 commits</a:t>
+            </a:r>
+            <a:r>
+              <a:rPr lang="en-US" sz="2400" dirty="0" smtClean="0"/>
+              <a:t> to all branches, excluding merges. On master, </a:t>
+            </a:r>
+            <a:r>
+              <a:rPr lang="en-US" sz="2400" b="1" dirty="0" smtClean="0"/>
+              <a:t>26 files</a:t>
+            </a:r>
+            <a:r>
+              <a:rPr lang="en-US" sz="2400" dirty="0" smtClean="0"/>
+              <a:t> have changed and there have been </a:t>
+            </a:r>
+            <a:r>
+              <a:rPr lang="en-US" sz="2400" b="1" dirty="0" smtClean="0"/>
+              <a:t>3,809</a:t>
+            </a:r>
+            <a:r>
+              <a:rPr lang="en-US" sz="2400" dirty="0" smtClean="0"/>
+              <a:t> </a:t>
+            </a:r>
+            <a:r>
+              <a:rPr lang="en-US" sz="2400" b="1" dirty="0" smtClean="0"/>
+              <a:t>additions</a:t>
+            </a:r>
+            <a:r>
+              <a:rPr lang="en-US" sz="2400" dirty="0" smtClean="0"/>
+              <a:t> and </a:t>
+            </a:r>
+            <a:r>
+              <a:rPr lang="en-US" sz="2400" b="1" dirty="0" smtClean="0"/>
+              <a:t>0</a:t>
+            </a:r>
+            <a:r>
+              <a:rPr lang="en-US" sz="2400" dirty="0" smtClean="0"/>
+              <a:t> </a:t>
+            </a:r>
+            <a:r>
+              <a:rPr lang="en-US" sz="2400" b="1" dirty="0" smtClean="0"/>
+              <a:t>deletions</a:t>
+            </a:r>
+            <a:r>
+              <a:rPr lang="en-US" sz="2400" dirty="0" smtClean="0"/>
+              <a:t>. </a:t>
+            </a:r>
+          </a:p>
+          <a:p>
+            <a:endParaRPr lang="en-US" dirty="0"/>
+          </a:p>
+        </p:txBody>
+      </p:sp>
+    </p:spTree>
+    <p:extLst>
+      <p:ext uri="{BB962C8B-B14F-4D97-AF65-F5344CB8AC3E}">
+        <p14:creationId xmlns:p14="http://schemas.microsoft.com/office/powerpoint/2010/main" xmlns:p="http://schemas.openxmlformats.org/presentationml/2006/main" xmlns:r="http://schemas.openxmlformats.org/officeDocument/2006/relationships" xmlns:a="http://schemas.openxmlformats.org/drawingml/2006/main" xmlns="" val="1100947228"/>
+      </p:ext>
+    </p:extLst>
+  </p:cSld>
+  <p:clrMapOvr>
+    <a:masterClrMapping/>
+  </p:clrMapOvr>
+</p:sld>
+</file>
+
+<file path=ppt/slides/slide12.xml><?xml version="1.0" encoding="utf-8"?>
+<p:sld xmlns:a="http://schemas.openxmlformats.org/drawingml/2006/main" xmlns:r="http://schemas.openxmlformats.org/officeDocument/2006/relationships" xmlns:mc="http://schemas.openxmlformats.org/markup-compatibility/2006" xmlns:mv="urn:schemas-microsoft-com:mac:vml" xmlns:p="http://schemas.openxmlformats.org/presentationml/2006/main" mc:Ignorable="mv" mc:PreserveAttributes="mv:*">
   <p:cSld>
     <p:spTree>
       <p:nvGrpSpPr>
@@ -3477,7 +3801,7 @@
           <a:blip r:embed="rId2">
             <a:extLst>
               <a:ext uri="{28A0092B-C50C-407E-A947-70E740481C1C}">
-                <a14:useLocalDpi xmlns:a14="http://schemas.microsoft.com/office/drawing/2010/main" val="0"/>
+                <a14:useLocalDpi xmlns:a14="http://schemas.microsoft.com/office/drawing/2010/main" xmlns:p="http://schemas.openxmlformats.org/presentationml/2006/main" xmlns:r="http://schemas.openxmlformats.org/officeDocument/2006/relationships" xmlns:a="http://schemas.openxmlformats.org/drawingml/2006/main" xmlns="" val="0"/>
               </a:ext>
             </a:extLst>
           </a:blip>
@@ -3523,7 +3847,7 @@
     </p:spTree>
     <p:extLst>
       <p:ext uri="{BB962C8B-B14F-4D97-AF65-F5344CB8AC3E}">
-        <p14:creationId xmlns:p14="http://schemas.microsoft.com/office/powerpoint/2010/main" val="2596349719"/>
+        <p14:creationId xmlns:p14="http://schemas.microsoft.com/office/powerpoint/2010/main" xmlns:p="http://schemas.openxmlformats.org/presentationml/2006/main" xmlns:r="http://schemas.openxmlformats.org/officeDocument/2006/relationships" xmlns:a="http://schemas.openxmlformats.org/drawingml/2006/main" xmlns="" val="2596349719"/>
       </p:ext>
     </p:extLst>
   </p:cSld>
@@ -3533,8 +3857,8 @@
 </p:sld>
 </file>
 
-<file path=ppt/slides/slide11.xml><?xml version="1.0" encoding="utf-8"?>
-<p:sld xmlns:a="http://schemas.openxmlformats.org/drawingml/2006/main" xmlns:r="http://schemas.openxmlformats.org/officeDocument/2006/relationships" xmlns:p="http://schemas.openxmlformats.org/presentationml/2006/main">
+<file path=ppt/slides/slide13.xml><?xml version="1.0" encoding="utf-8"?>
+<p:sld xmlns:a="http://schemas.openxmlformats.org/drawingml/2006/main" xmlns:r="http://schemas.openxmlformats.org/officeDocument/2006/relationships" xmlns:mc="http://schemas.openxmlformats.org/markup-compatibility/2006" xmlns:mv="urn:schemas-microsoft-com:mac:vml" xmlns:p="http://schemas.openxmlformats.org/presentationml/2006/main" mc:Ignorable="mv" mc:PreserveAttributes="mv:*">
   <p:cSld>
     <p:spTree>
       <p:nvGrpSpPr>
@@ -3587,7 +3911,7 @@
           <a:blip r:embed="rId2">
             <a:extLst>
               <a:ext uri="{28A0092B-C50C-407E-A947-70E740481C1C}">
-                <a14:useLocalDpi xmlns:a14="http://schemas.microsoft.com/office/drawing/2010/main" val="0"/>
+                <a14:useLocalDpi xmlns:a14="http://schemas.microsoft.com/office/drawing/2010/main" xmlns:p="http://schemas.openxmlformats.org/presentationml/2006/main" xmlns:r="http://schemas.openxmlformats.org/officeDocument/2006/relationships" xmlns:a="http://schemas.openxmlformats.org/drawingml/2006/main" xmlns="" val="0"/>
               </a:ext>
             </a:extLst>
           </a:blip>
@@ -3605,7 +3929,7 @@
     </p:spTree>
     <p:extLst>
       <p:ext uri="{BB962C8B-B14F-4D97-AF65-F5344CB8AC3E}">
-        <p14:creationId xmlns:p14="http://schemas.microsoft.com/office/powerpoint/2010/main" val="1669399052"/>
+        <p14:creationId xmlns:p14="http://schemas.microsoft.com/office/powerpoint/2010/main" xmlns:p="http://schemas.openxmlformats.org/presentationml/2006/main" xmlns:r="http://schemas.openxmlformats.org/officeDocument/2006/relationships" xmlns:a="http://schemas.openxmlformats.org/drawingml/2006/main" xmlns="" val="1669399052"/>
       </p:ext>
     </p:extLst>
   </p:cSld>
@@ -3615,8 +3939,8 @@
 </p:sld>
 </file>
 
-<file path=ppt/slides/slide12.xml><?xml version="1.0" encoding="utf-8"?>
-<p:sld xmlns:a="http://schemas.openxmlformats.org/drawingml/2006/main" xmlns:r="http://schemas.openxmlformats.org/officeDocument/2006/relationships" xmlns:p="http://schemas.openxmlformats.org/presentationml/2006/main">
+<file path=ppt/slides/slide14.xml><?xml version="1.0" encoding="utf-8"?>
+<p:sld xmlns:a="http://schemas.openxmlformats.org/drawingml/2006/main" xmlns:r="http://schemas.openxmlformats.org/officeDocument/2006/relationships" xmlns:mc="http://schemas.openxmlformats.org/markup-compatibility/2006" xmlns:mv="urn:schemas-microsoft-com:mac:vml" xmlns:p="http://schemas.openxmlformats.org/presentationml/2006/main" mc:Ignorable="mv" mc:PreserveAttributes="mv:*">
   <p:cSld>
     <p:spTree>
       <p:nvGrpSpPr>
@@ -3684,8 +4008,24 @@
           </a:p>
           <a:p>
             <a:r>
+              <a:rPr lang="en-US" sz="3200" smtClean="0"/>
+              <a:t>Get</a:t>
+            </a:r>
+            <a:r>
+              <a:rPr lang="en-US" sz="3200" smtClean="0"/>
+              <a:t> </a:t>
+            </a:r>
+            <a:r>
+              <a:rPr lang="en-US" sz="3200" smtClean="0"/>
+              <a:t>more</a:t>
+            </a:r>
+            <a:r>
+              <a:rPr lang="en-US" sz="3200" smtClean="0"/>
+              <a:t> </a:t>
+            </a:r>
+            <a:r>
               <a:rPr lang="en-US" sz="3200" dirty="0" smtClean="0"/>
-              <a:t>Get with experience with web development</a:t>
+              <a:t>experience with web development</a:t>
             </a:r>
           </a:p>
           <a:p>
@@ -3953,7 +4293,7 @@
     </p:spTree>
     <p:extLst>
       <p:ext uri="{BB962C8B-B14F-4D97-AF65-F5344CB8AC3E}">
-        <p14:creationId xmlns:p14="http://schemas.microsoft.com/office/powerpoint/2010/main" val="801029398"/>
+        <p14:creationId xmlns:p14="http://schemas.microsoft.com/office/powerpoint/2010/main" xmlns:p="http://schemas.openxmlformats.org/presentationml/2006/main" xmlns:r="http://schemas.openxmlformats.org/officeDocument/2006/relationships" xmlns:a="http://schemas.openxmlformats.org/drawingml/2006/main" xmlns="" val="801029398"/>
       </p:ext>
     </p:extLst>
   </p:cSld>
@@ -3963,8 +4303,8 @@
 </p:sld>
 </file>
 
-<file path=ppt/slides/slide13.xml><?xml version="1.0" encoding="utf-8"?>
-<p:sld xmlns:a="http://schemas.openxmlformats.org/drawingml/2006/main" xmlns:r="http://schemas.openxmlformats.org/officeDocument/2006/relationships" xmlns:p="http://schemas.openxmlformats.org/presentationml/2006/main">
+<file path=ppt/slides/slide15.xml><?xml version="1.0" encoding="utf-8"?>
+<p:sld xmlns:a="http://schemas.openxmlformats.org/drawingml/2006/main" xmlns:r="http://schemas.openxmlformats.org/officeDocument/2006/relationships" xmlns:mc="http://schemas.openxmlformats.org/markup-compatibility/2006" xmlns:mv="urn:schemas-microsoft-com:mac:vml" xmlns:p="http://schemas.openxmlformats.org/presentationml/2006/main" mc:Ignorable="mv" mc:PreserveAttributes="mv:*">
   <p:cSld>
     <p:spTree>
       <p:nvGrpSpPr>
@@ -4073,7 +4413,7 @@
     </p:spTree>
     <p:extLst>
       <p:ext uri="{BB962C8B-B14F-4D97-AF65-F5344CB8AC3E}">
-        <p14:creationId xmlns:p14="http://schemas.microsoft.com/office/powerpoint/2010/main" val="1335060321"/>
+        <p14:creationId xmlns:p14="http://schemas.microsoft.com/office/powerpoint/2010/main" xmlns:p="http://schemas.openxmlformats.org/presentationml/2006/main" xmlns:r="http://schemas.openxmlformats.org/officeDocument/2006/relationships" xmlns:a="http://schemas.openxmlformats.org/drawingml/2006/main" xmlns="" val="1335060321"/>
       </p:ext>
     </p:extLst>
   </p:cSld>
@@ -4083,8 +4423,8 @@
 </p:sld>
 </file>
 
-<file path=ppt/slides/slide14.xml><?xml version="1.0" encoding="utf-8"?>
-<p:sld xmlns:a="http://schemas.openxmlformats.org/drawingml/2006/main" xmlns:r="http://schemas.openxmlformats.org/officeDocument/2006/relationships" xmlns:p="http://schemas.openxmlformats.org/presentationml/2006/main">
+<file path=ppt/slides/slide16.xml><?xml version="1.0" encoding="utf-8"?>
+<p:sld xmlns:a="http://schemas.openxmlformats.org/drawingml/2006/main" xmlns:r="http://schemas.openxmlformats.org/officeDocument/2006/relationships" xmlns:mc="http://schemas.openxmlformats.org/markup-compatibility/2006" xmlns:mv="urn:schemas-microsoft-com:mac:vml" xmlns:p="http://schemas.openxmlformats.org/presentationml/2006/main" mc:Ignorable="mv" mc:PreserveAttributes="mv:*">
   <p:cSld>
     <p:spTree>
       <p:nvGrpSpPr>
@@ -4137,7 +4477,7 @@
           <a:blip r:embed="rId2">
             <a:extLst>
               <a:ext uri="{28A0092B-C50C-407E-A947-70E740481C1C}">
-                <a14:useLocalDpi xmlns:a14="http://schemas.microsoft.com/office/drawing/2010/main" val="0"/>
+                <a14:useLocalDpi xmlns:a14="http://schemas.microsoft.com/office/drawing/2010/main" xmlns:p="http://schemas.openxmlformats.org/presentationml/2006/main" xmlns:r="http://schemas.openxmlformats.org/officeDocument/2006/relationships" xmlns:a="http://schemas.openxmlformats.org/drawingml/2006/main" xmlns="" val="0"/>
               </a:ext>
             </a:extLst>
           </a:blip>
@@ -4157,7 +4497,7 @@
           <a:noFill/>
           <a:extLst>
             <a:ext uri="{909E8E84-426E-40DD-AFC4-6F175D3DCCD1}">
-              <a14:hiddenFill xmlns:a14="http://schemas.microsoft.com/office/drawing/2010/main">
+              <a14:hiddenFill xmlns:a14="http://schemas.microsoft.com/office/drawing/2010/main" xmlns:p="http://schemas.openxmlformats.org/presentationml/2006/main" xmlns:r="http://schemas.openxmlformats.org/officeDocument/2006/relationships" xmlns:a="http://schemas.openxmlformats.org/drawingml/2006/main" xmlns="">
                 <a:solidFill>
                   <a:srgbClr val="FFFFFF"/>
                 </a:solidFill>
@@ -4169,7 +4509,7 @@
     </p:spTree>
     <p:extLst>
       <p:ext uri="{BB962C8B-B14F-4D97-AF65-F5344CB8AC3E}">
-        <p14:creationId xmlns:p14="http://schemas.microsoft.com/office/powerpoint/2010/main" val="3449498826"/>
+        <p14:creationId xmlns:p14="http://schemas.microsoft.com/office/powerpoint/2010/main" xmlns:p="http://schemas.openxmlformats.org/presentationml/2006/main" xmlns:r="http://schemas.openxmlformats.org/officeDocument/2006/relationships" xmlns:a="http://schemas.openxmlformats.org/drawingml/2006/main" xmlns="" val="3449498826"/>
       </p:ext>
     </p:extLst>
   </p:cSld>
@@ -4180,7 +4520,7 @@
 </file>
 
 <file path=ppt/slides/slide2.xml><?xml version="1.0" encoding="utf-8"?>
-<p:sld xmlns:a="http://schemas.openxmlformats.org/drawingml/2006/main" xmlns:r="http://schemas.openxmlformats.org/officeDocument/2006/relationships" xmlns:p="http://schemas.openxmlformats.org/presentationml/2006/main">
+<p:sld xmlns:a="http://schemas.openxmlformats.org/drawingml/2006/main" xmlns:r="http://schemas.openxmlformats.org/officeDocument/2006/relationships" xmlns:mc="http://schemas.openxmlformats.org/markup-compatibility/2006" xmlns:mv="urn:schemas-microsoft-com:mac:vml" xmlns:p="http://schemas.openxmlformats.org/presentationml/2006/main" mc:Ignorable="mv" mc:PreserveAttributes="mv:*">
   <p:cSld>
     <p:spTree>
       <p:nvGrpSpPr>
@@ -4265,7 +4605,7 @@
     </p:spTree>
     <p:extLst>
       <p:ext uri="{BB962C8B-B14F-4D97-AF65-F5344CB8AC3E}">
-        <p14:creationId xmlns:p14="http://schemas.microsoft.com/office/powerpoint/2010/main" val="109255455"/>
+        <p14:creationId xmlns:p14="http://schemas.microsoft.com/office/powerpoint/2010/main" xmlns:p="http://schemas.openxmlformats.org/presentationml/2006/main" xmlns:r="http://schemas.openxmlformats.org/officeDocument/2006/relationships" xmlns:a="http://schemas.openxmlformats.org/drawingml/2006/main" xmlns="" val="109255455"/>
       </p:ext>
     </p:extLst>
   </p:cSld>
@@ -4276,7 +4616,7 @@
 </file>
 
 <file path=ppt/slides/slide3.xml><?xml version="1.0" encoding="utf-8"?>
-<p:sld xmlns:a="http://schemas.openxmlformats.org/drawingml/2006/main" xmlns:r="http://schemas.openxmlformats.org/officeDocument/2006/relationships" xmlns:p="http://schemas.openxmlformats.org/presentationml/2006/main">
+<p:sld xmlns:a="http://schemas.openxmlformats.org/drawingml/2006/main" xmlns:r="http://schemas.openxmlformats.org/officeDocument/2006/relationships" xmlns:mc="http://schemas.openxmlformats.org/markup-compatibility/2006" xmlns:mv="urn:schemas-microsoft-com:mac:vml" xmlns:p="http://schemas.openxmlformats.org/presentationml/2006/main" mc:Ignorable="mv" mc:PreserveAttributes="mv:*">
   <p:cSld>
     <p:spTree>
       <p:nvGrpSpPr>
@@ -4341,14 +4681,16 @@
             <a:pPr lvl="1"/>
             <a:r>
               <a:rPr lang="en-US" sz="2800" dirty="0" smtClean="0"/>
-              <a:t>Need a system to encourage communication between employees</a:t>
-            </a:r>
+              <a:t>We need easier communication between employees</a:t>
+            </a:r>
+            <a:endParaRPr lang="en-US" sz="2800" dirty="0" smtClean="0"/>
           </a:p>
           <a:p>
             <a:r>
               <a:rPr lang="en-US" sz="3200" dirty="0" smtClean="0"/>
               <a:t>Solution</a:t>
             </a:r>
+            <a:endParaRPr lang="en-US" sz="3200" dirty="0" smtClean="0"/>
           </a:p>
           <a:p>
             <a:pPr lvl="1"/>
@@ -4390,7 +4732,7 @@
     </p:spTree>
     <p:extLst>
       <p:ext uri="{BB962C8B-B14F-4D97-AF65-F5344CB8AC3E}">
-        <p14:creationId xmlns:p14="http://schemas.microsoft.com/office/powerpoint/2010/main" val="3594963355"/>
+        <p14:creationId xmlns:p14="http://schemas.microsoft.com/office/powerpoint/2010/main" xmlns:p="http://schemas.openxmlformats.org/presentationml/2006/main" xmlns:r="http://schemas.openxmlformats.org/officeDocument/2006/relationships" xmlns:a="http://schemas.openxmlformats.org/drawingml/2006/main" xmlns="" val="3594963355"/>
       </p:ext>
     </p:extLst>
   </p:cSld>
@@ -4401,7 +4743,7 @@
 </file>
 
 <file path=ppt/slides/slide4.xml><?xml version="1.0" encoding="utf-8"?>
-<p:sld xmlns:a="http://schemas.openxmlformats.org/drawingml/2006/main" xmlns:r="http://schemas.openxmlformats.org/officeDocument/2006/relationships" xmlns:p="http://schemas.openxmlformats.org/presentationml/2006/main">
+<p:sld xmlns:a="http://schemas.openxmlformats.org/drawingml/2006/main" xmlns:r="http://schemas.openxmlformats.org/officeDocument/2006/relationships" xmlns:mc="http://schemas.openxmlformats.org/markup-compatibility/2006" xmlns:mv="urn:schemas-microsoft-com:mac:vml" xmlns:p="http://schemas.openxmlformats.org/presentationml/2006/main" mc:Ignorable="mv" mc:PreserveAttributes="mv:*">
   <p:cSld>
     <p:spTree>
       <p:nvGrpSpPr>
@@ -4472,42 +4814,48 @@
               <a:rPr lang="en-US" sz="3200" dirty="0" smtClean="0"/>
               <a:t>How does it work?</a:t>
             </a:r>
+            <a:endParaRPr lang="en-US" sz="3200" dirty="0" smtClean="0"/>
           </a:p>
           <a:p>
             <a:pPr lvl="1"/>
             <a:r>
               <a:rPr lang="en-US" sz="2800" dirty="0" smtClean="0"/>
-              <a:t>Users posts messages that can be seen by other users</a:t>
+              <a:t>Post</a:t>
             </a:r>
           </a:p>
           <a:p>
             <a:pPr lvl="1"/>
             <a:r>
               <a:rPr lang="en-US" sz="2800" dirty="0" smtClean="0"/>
-              <a:t>Users can subscribe to other users to see everything they post</a:t>
+              <a:t>Follow users</a:t>
             </a:r>
           </a:p>
           <a:p>
             <a:pPr lvl="1"/>
             <a:r>
               <a:rPr lang="en-US" sz="2800" dirty="0" smtClean="0"/>
-              <a:t>Users can also subscribe to certain topics designated by a #</a:t>
-            </a:r>
+              <a:t>Follow </a:t>
+            </a:r>
+            <a:r>
+              <a:rPr lang="en-US" sz="2800" dirty="0" err="1" smtClean="0"/>
+              <a:t>hashtags</a:t>
+            </a:r>
+            <a:endParaRPr lang="en-US" sz="2800" dirty="0" smtClean="0"/>
           </a:p>
           <a:p>
             <a:pPr lvl="1"/>
             <a:r>
-              <a:rPr lang="en-US" dirty="0" smtClean="0"/>
-              <a:t> </a:t>
-            </a:r>
-            <a:endParaRPr lang="en-US" dirty="0"/>
+              <a:rPr lang="en-US" sz="2800" dirty="0" smtClean="0"/>
+              <a:t>See the posts they want to see</a:t>
+            </a:r>
+            <a:endParaRPr lang="en-US" sz="2800" dirty="0" smtClean="0"/>
           </a:p>
         </p:txBody>
       </p:sp>
     </p:spTree>
     <p:extLst>
       <p:ext uri="{BB962C8B-B14F-4D97-AF65-F5344CB8AC3E}">
-        <p14:creationId xmlns:p14="http://schemas.microsoft.com/office/powerpoint/2010/main" val="2586821550"/>
+        <p14:creationId xmlns:p14="http://schemas.microsoft.com/office/powerpoint/2010/main" xmlns:p="http://schemas.openxmlformats.org/presentationml/2006/main" xmlns:r="http://schemas.openxmlformats.org/officeDocument/2006/relationships" xmlns:a="http://schemas.openxmlformats.org/drawingml/2006/main" xmlns="" val="2586821550"/>
       </p:ext>
     </p:extLst>
   </p:cSld>
@@ -4518,7 +4866,7 @@
 </file>
 
 <file path=ppt/slides/slide5.xml><?xml version="1.0" encoding="utf-8"?>
-<p:sld xmlns:a="http://schemas.openxmlformats.org/drawingml/2006/main" xmlns:r="http://schemas.openxmlformats.org/officeDocument/2006/relationships" xmlns:p="http://schemas.openxmlformats.org/presentationml/2006/main">
+<p:sld xmlns:a="http://schemas.openxmlformats.org/drawingml/2006/main" xmlns:r="http://schemas.openxmlformats.org/officeDocument/2006/relationships" xmlns:mc="http://schemas.openxmlformats.org/markup-compatibility/2006" xmlns:mv="urn:schemas-microsoft-com:mac:vml" xmlns:p="http://schemas.openxmlformats.org/presentationml/2006/main" mc:Ignorable="mv" mc:PreserveAttributes="mv:*">
   <p:cSld>
     <p:spTree>
       <p:nvGrpSpPr>
@@ -4551,105 +4899,183 @@
           <a:p>
             <a:r>
               <a:rPr lang="en-US" dirty="0" smtClean="0"/>
-              <a:t>Design Evolution</a:t>
+              <a:t>Seeing Some of the Implementation</a:t>
             </a:r>
             <a:endParaRPr lang="en-US" dirty="0"/>
           </a:p>
         </p:txBody>
       </p:sp>
-      <p:sp>
-        <p:nvSpPr>
-          <p:cNvPr id="3" name="Content Placeholder 2"/>
-          <p:cNvSpPr>
-            <a:spLocks noGrp="1"/>
-          </p:cNvSpPr>
+      <p:pic>
+        <p:nvPicPr>
+          <p:cNvPr id="4" name="Content Placeholder 3" descr="Screen Shot 2013-12-09 at 2.01.48 PM.png"/>
+          <p:cNvPicPr>
+            <a:picLocks noGrp="1" noChangeAspect="1"/>
+          </p:cNvPicPr>
           <p:nvPr>
             <p:ph idx="1"/>
           </p:nvPr>
-        </p:nvSpPr>
-        <p:spPr/>
-        <p:txBody>
-          <a:bodyPr/>
-          <a:lstStyle/>
-          <a:p>
-            <a:r>
-              <a:rPr lang="en-US" sz="3200" dirty="0" smtClean="0"/>
-              <a:t>Group had no previous web development experience</a:t>
-            </a:r>
-          </a:p>
-          <a:p>
-            <a:r>
-              <a:rPr lang="en-US" sz="3200" dirty="0" smtClean="0"/>
-              <a:t>Languages</a:t>
-            </a:r>
-          </a:p>
-          <a:p>
-            <a:pPr lvl="1"/>
-            <a:r>
-              <a:rPr lang="en-US" sz="2800" dirty="0" smtClean="0"/>
-              <a:t>Intended to use </a:t>
-            </a:r>
-            <a:r>
-              <a:rPr lang="en-US" sz="2800" dirty="0" err="1" smtClean="0"/>
-              <a:t>php</a:t>
-            </a:r>
-            <a:r>
-              <a:rPr lang="en-US" sz="2800" dirty="0" smtClean="0"/>
-              <a:t>, </a:t>
-            </a:r>
-            <a:r>
-              <a:rPr lang="en-US" sz="2800" dirty="0" err="1" smtClean="0"/>
-              <a:t>mysql</a:t>
-            </a:r>
-            <a:r>
-              <a:rPr lang="en-US" sz="2800" dirty="0" smtClean="0"/>
-              <a:t>, </a:t>
-            </a:r>
-            <a:r>
-              <a:rPr lang="en-US" sz="2800" dirty="0" err="1" smtClean="0"/>
-              <a:t>javascript</a:t>
-            </a:r>
-            <a:endParaRPr lang="en-US" sz="2800" dirty="0" smtClean="0"/>
-          </a:p>
-          <a:p>
-            <a:pPr lvl="1"/>
-            <a:r>
-              <a:rPr lang="en-US" sz="2800" dirty="0" smtClean="0"/>
-              <a:t>Dropped </a:t>
-            </a:r>
-            <a:r>
-              <a:rPr lang="en-US" sz="2800" dirty="0" err="1" smtClean="0"/>
-              <a:t>javascript</a:t>
-            </a:r>
-            <a:endParaRPr lang="en-US" sz="2800" dirty="0" smtClean="0"/>
-          </a:p>
-          <a:p>
-            <a:r>
-              <a:rPr lang="en-US" sz="3200" dirty="0" smtClean="0"/>
-              <a:t>Started with MVC in mind</a:t>
-            </a:r>
-          </a:p>
-          <a:p>
-            <a:pPr lvl="1"/>
-            <a:r>
-              <a:rPr lang="en-US" sz="2800" dirty="0" smtClean="0"/>
-              <a:t>Shifted away because of impending deadlines/inexperience</a:t>
-            </a:r>
-          </a:p>
-          <a:p>
-            <a:endParaRPr lang="en-US" sz="3200" dirty="0" smtClean="0"/>
-          </a:p>
-          <a:p>
+        </p:nvPicPr>
+        <p:blipFill>
+          <a:blip r:embed="rId2"/>
+          <a:srcRect t="-80437" b="-80437"/>
+          <a:stretch>
+            <a:fillRect/>
+          </a:stretch>
+        </p:blipFill>
+        <p:spPr>
+          <a:xfrm>
+            <a:off x="0" y="990600"/>
+            <a:ext cx="5257800" cy="3115733"/>
+          </a:xfrm>
+        </p:spPr>
+      </p:pic>
+      <p:pic>
+        <p:nvPicPr>
+          <p:cNvPr id="5" name="Picture 4" descr="Screen Shot 2013-12-09 at 2.04.42 PM.png"/>
+          <p:cNvPicPr>
+            <a:picLocks noChangeAspect="1"/>
+          </p:cNvPicPr>
+          <p:nvPr/>
+        </p:nvPicPr>
+        <p:blipFill>
+          <a:blip r:embed="rId3"/>
+          <a:stretch>
+            <a:fillRect/>
+          </a:stretch>
+        </p:blipFill>
+        <p:spPr>
+          <a:xfrm>
+            <a:off x="0" y="3733800"/>
+            <a:ext cx="4993448" cy="2514600"/>
+          </a:xfrm>
+          <a:prstGeom prst="rect">
+            <a:avLst/>
+          </a:prstGeom>
+        </p:spPr>
+      </p:pic>
+      <p:sp>
+        <p:nvSpPr>
+          <p:cNvPr id="6" name="TextBox 5"/>
+          <p:cNvSpPr txBox="1"/>
+          <p:nvPr/>
+        </p:nvSpPr>
+        <p:spPr>
+          <a:xfrm>
+            <a:off x="1752600" y="1600200"/>
+            <a:ext cx="903312" cy="369332"/>
+          </a:xfrm>
+          <a:prstGeom prst="rect">
+            <a:avLst/>
+          </a:prstGeom>
+          <a:noFill/>
+        </p:spPr>
+        <p:txBody>
+          <a:bodyPr wrap="none" rtlCol="0">
+            <a:spAutoFit/>
+          </a:bodyPr>
+          <a:lstStyle/>
+          <a:p>
+            <a:r>
+              <a:rPr lang="en-US" dirty="0" smtClean="0"/>
+              <a:t>Sign In</a:t>
+            </a:r>
             <a:endParaRPr lang="en-US" dirty="0"/>
           </a:p>
         </p:txBody>
       </p:sp>
+      <p:sp>
+        <p:nvSpPr>
+          <p:cNvPr id="7" name="TextBox 6"/>
+          <p:cNvSpPr txBox="1"/>
+          <p:nvPr/>
+        </p:nvSpPr>
+        <p:spPr>
+          <a:xfrm>
+            <a:off x="2057400" y="3276600"/>
+            <a:ext cx="646556" cy="369332"/>
+          </a:xfrm>
+          <a:prstGeom prst="rect">
+            <a:avLst/>
+          </a:prstGeom>
+          <a:noFill/>
+        </p:spPr>
+        <p:txBody>
+          <a:bodyPr wrap="none" rtlCol="0">
+            <a:spAutoFit/>
+          </a:bodyPr>
+          <a:lstStyle/>
+          <a:p>
+            <a:r>
+              <a:rPr lang="en-US" dirty="0" smtClean="0"/>
+              <a:t>Post</a:t>
+            </a:r>
+            <a:endParaRPr lang="en-US" dirty="0"/>
+          </a:p>
+        </p:txBody>
+      </p:sp>
+      <p:pic>
+        <p:nvPicPr>
+          <p:cNvPr id="8" name="Picture 7" descr="Screen Shot 2013-12-09 at 2.33.12 PM.png"/>
+          <p:cNvPicPr>
+            <a:picLocks noChangeAspect="1"/>
+          </p:cNvPicPr>
+          <p:nvPr/>
+        </p:nvPicPr>
+        <p:blipFill>
+          <a:blip r:embed="rId4"/>
+          <a:stretch>
+            <a:fillRect/>
+          </a:stretch>
+        </p:blipFill>
+        <p:spPr>
+          <a:xfrm>
+            <a:off x="5257800" y="2133600"/>
+            <a:ext cx="3886200" cy="4432300"/>
+          </a:xfrm>
+          <a:prstGeom prst="rect">
+            <a:avLst/>
+          </a:prstGeom>
+        </p:spPr>
+      </p:pic>
+      <p:sp>
+        <p:nvSpPr>
+          <p:cNvPr id="9" name="TextBox 8"/>
+          <p:cNvSpPr txBox="1"/>
+          <p:nvPr/>
+        </p:nvSpPr>
+        <p:spPr>
+          <a:xfrm>
+            <a:off x="5562600" y="1676400"/>
+            <a:ext cx="3327842" cy="369332"/>
+          </a:xfrm>
+          <a:prstGeom prst="rect">
+            <a:avLst/>
+          </a:prstGeom>
+          <a:noFill/>
+        </p:spPr>
+        <p:txBody>
+          <a:bodyPr wrap="none" rtlCol="0">
+            <a:spAutoFit/>
+          </a:bodyPr>
+          <a:lstStyle/>
+          <a:p>
+            <a:r>
+              <a:rPr lang="en-US" dirty="0" smtClean="0"/>
+              <a:t>Displaying </a:t>
+            </a:r>
+            <a:r>
+              <a:rPr lang="en-US" dirty="0" err="1" smtClean="0"/>
+              <a:t>Hashtags</a:t>
+            </a:r>
+            <a:r>
+              <a:rPr lang="en-US" dirty="0" smtClean="0"/>
+              <a:t> in system</a:t>
+            </a:r>
+            <a:endParaRPr lang="en-US" dirty="0"/>
+          </a:p>
+        </p:txBody>
+      </p:sp>
     </p:spTree>
-    <p:extLst>
-      <p:ext uri="{BB962C8B-B14F-4D97-AF65-F5344CB8AC3E}">
-        <p14:creationId xmlns:p14="http://schemas.microsoft.com/office/powerpoint/2010/main" val="297214769"/>
-      </p:ext>
-    </p:extLst>
   </p:cSld>
   <p:clrMapOvr>
     <a:masterClrMapping/>
@@ -4658,7 +5084,7 @@
 </file>
 
 <file path=ppt/slides/slide6.xml><?xml version="1.0" encoding="utf-8"?>
-<p:sld xmlns:a="http://schemas.openxmlformats.org/drawingml/2006/main" xmlns:r="http://schemas.openxmlformats.org/officeDocument/2006/relationships" xmlns:p="http://schemas.openxmlformats.org/presentationml/2006/main">
+<p:sld xmlns:a="http://schemas.openxmlformats.org/drawingml/2006/main" xmlns:r="http://schemas.openxmlformats.org/officeDocument/2006/relationships" xmlns:mc="http://schemas.openxmlformats.org/markup-compatibility/2006" xmlns:mv="urn:schemas-microsoft-com:mac:vml" xmlns:p="http://schemas.openxmlformats.org/presentationml/2006/main" mc:Ignorable="mv" mc:PreserveAttributes="mv:*">
   <p:cSld>
     <p:spTree>
       <p:nvGrpSpPr>
@@ -4691,80 +5117,175 @@
           <a:p>
             <a:r>
               <a:rPr lang="en-US" dirty="0" smtClean="0"/>
-              <a:t>Missing Features</a:t>
+              <a:t>Seeing Some of the Implementation</a:t>
             </a:r>
             <a:endParaRPr lang="en-US" dirty="0"/>
           </a:p>
         </p:txBody>
       </p:sp>
-      <p:sp>
-        <p:nvSpPr>
-          <p:cNvPr id="3" name="Content Placeholder 2"/>
-          <p:cNvSpPr>
-            <a:spLocks noGrp="1"/>
-          </p:cNvSpPr>
+      <p:pic>
+        <p:nvPicPr>
+          <p:cNvPr id="4" name="Content Placeholder 3" descr="Screen Shot 2013-12-09 at 2.38.20 PM.png"/>
+          <p:cNvPicPr>
+            <a:picLocks noGrp="1" noChangeAspect="1"/>
+          </p:cNvPicPr>
           <p:nvPr>
             <p:ph idx="1"/>
           </p:nvPr>
-        </p:nvSpPr>
-        <p:spPr/>
-        <p:txBody>
-          <a:bodyPr>
-            <a:normAutofit/>
+        </p:nvPicPr>
+        <p:blipFill>
+          <a:blip r:embed="rId2"/>
+          <a:srcRect l="-99877" r="-99877"/>
+          <a:stretch>
+            <a:fillRect/>
+          </a:stretch>
+        </p:blipFill>
+        <p:spPr>
+          <a:xfrm>
+            <a:off x="-1981200" y="2133600"/>
+            <a:ext cx="7458075" cy="4419600"/>
+          </a:xfrm>
+        </p:spPr>
+      </p:pic>
+      <p:sp>
+        <p:nvSpPr>
+          <p:cNvPr id="5" name="TextBox 4"/>
+          <p:cNvSpPr txBox="1"/>
+          <p:nvPr/>
+        </p:nvSpPr>
+        <p:spPr>
+          <a:xfrm>
+            <a:off x="609600" y="1600200"/>
+            <a:ext cx="1275597" cy="369332"/>
+          </a:xfrm>
+          <a:prstGeom prst="rect">
+            <a:avLst/>
+          </a:prstGeom>
+          <a:noFill/>
+        </p:spPr>
+        <p:txBody>
+          <a:bodyPr wrap="none" rtlCol="0">
+            <a:spAutoFit/>
           </a:bodyPr>
           <a:lstStyle/>
           <a:p>
             <a:r>
-              <a:rPr lang="en-US" sz="3200" dirty="0" smtClean="0"/>
-              <a:t>UI design</a:t>
-            </a:r>
-          </a:p>
-          <a:p>
-            <a:pPr lvl="1"/>
-            <a:r>
-              <a:rPr lang="en-US" sz="2800" dirty="0" smtClean="0"/>
-              <a:t>Missing CSS</a:t>
-            </a:r>
-          </a:p>
-          <a:p>
-            <a:r>
-              <a:rPr lang="en-US" sz="3200" dirty="0"/>
-              <a:t>Requirements 2 and 14 were dropped from the required list of </a:t>
-            </a:r>
-            <a:r>
-              <a:rPr lang="en-US" sz="3200" dirty="0" smtClean="0"/>
-              <a:t>functionalities</a:t>
-            </a:r>
-          </a:p>
-          <a:p>
-            <a:r>
-              <a:rPr lang="en-US" sz="3200" dirty="0" smtClean="0"/>
-              <a:t>Still Implementing:</a:t>
-            </a:r>
-          </a:p>
-          <a:p>
-            <a:pPr lvl="1"/>
-            <a:r>
-              <a:rPr lang="en-US" sz="2800" dirty="0" smtClean="0"/>
-              <a:t>Requirement 4-Password Strength</a:t>
-            </a:r>
-          </a:p>
-          <a:p>
-            <a:pPr lvl="1"/>
-            <a:r>
-              <a:rPr lang="en-US" sz="2800" dirty="0" smtClean="0"/>
-              <a:t>Requirement 13- Sorting Posts</a:t>
-            </a:r>
-            <a:endParaRPr lang="en-US" sz="2800" dirty="0"/>
+              <a:rPr lang="en-US" dirty="0" smtClean="0"/>
+              <a:t>Signing up</a:t>
+            </a:r>
+            <a:endParaRPr lang="en-US" dirty="0"/>
+          </a:p>
+        </p:txBody>
+      </p:sp>
+      <p:sp>
+        <p:nvSpPr>
+          <p:cNvPr id="7" name="TextBox 6"/>
+          <p:cNvSpPr txBox="1"/>
+          <p:nvPr/>
+        </p:nvSpPr>
+        <p:spPr>
+          <a:xfrm>
+            <a:off x="3276600" y="1752600"/>
+            <a:ext cx="2096360" cy="369332"/>
+          </a:xfrm>
+          <a:prstGeom prst="rect">
+            <a:avLst/>
+          </a:prstGeom>
+          <a:noFill/>
+        </p:spPr>
+        <p:txBody>
+          <a:bodyPr wrap="none" rtlCol="0">
+            <a:spAutoFit/>
+          </a:bodyPr>
+          <a:lstStyle/>
+          <a:p>
+            <a:r>
+              <a:rPr lang="en-US" dirty="0" smtClean="0"/>
+              <a:t>Password strength</a:t>
+            </a:r>
+            <a:endParaRPr lang="en-US" dirty="0"/>
+          </a:p>
+        </p:txBody>
+      </p:sp>
+      <p:pic>
+        <p:nvPicPr>
+          <p:cNvPr id="8" name="Picture 7" descr="Screen Shot 2013-12-09 at 2.49.16 PM.png"/>
+          <p:cNvPicPr>
+            <a:picLocks noChangeAspect="1"/>
+          </p:cNvPicPr>
+          <p:nvPr/>
+        </p:nvPicPr>
+        <p:blipFill>
+          <a:blip r:embed="rId3"/>
+          <a:stretch>
+            <a:fillRect/>
+          </a:stretch>
+        </p:blipFill>
+        <p:spPr>
+          <a:xfrm>
+            <a:off x="2514600" y="4038600"/>
+            <a:ext cx="6629400" cy="2616351"/>
+          </a:xfrm>
+          <a:prstGeom prst="rect">
+            <a:avLst/>
+          </a:prstGeom>
+        </p:spPr>
+      </p:pic>
+      <p:pic>
+        <p:nvPicPr>
+          <p:cNvPr id="9" name="Picture 8" descr="Screen Shot 2013-12-09 at 2.49.56 PM.png"/>
+          <p:cNvPicPr>
+            <a:picLocks noChangeAspect="1"/>
+          </p:cNvPicPr>
+          <p:nvPr/>
+        </p:nvPicPr>
+        <p:blipFill>
+          <a:blip r:embed="rId4"/>
+          <a:stretch>
+            <a:fillRect/>
+          </a:stretch>
+        </p:blipFill>
+        <p:spPr>
+          <a:xfrm>
+            <a:off x="3048000" y="2209800"/>
+            <a:ext cx="3378200" cy="1683772"/>
+          </a:xfrm>
+          <a:prstGeom prst="rect">
+            <a:avLst/>
+          </a:prstGeom>
+        </p:spPr>
+      </p:pic>
+      <p:sp>
+        <p:nvSpPr>
+          <p:cNvPr id="10" name="TextBox 9"/>
+          <p:cNvSpPr txBox="1"/>
+          <p:nvPr/>
+        </p:nvSpPr>
+        <p:spPr>
+          <a:xfrm>
+            <a:off x="7162800" y="3657600"/>
+            <a:ext cx="1262635" cy="369332"/>
+          </a:xfrm>
+          <a:prstGeom prst="rect">
+            <a:avLst/>
+          </a:prstGeom>
+          <a:noFill/>
+        </p:spPr>
+        <p:txBody>
+          <a:bodyPr wrap="none" rtlCol="0">
+            <a:spAutoFit/>
+          </a:bodyPr>
+          <a:lstStyle/>
+          <a:p>
+            <a:r>
+              <a:rPr lang="en-US" dirty="0" smtClean="0"/>
+              <a:t>Main page</a:t>
+            </a:r>
+            <a:endParaRPr lang="en-US" dirty="0"/>
           </a:p>
         </p:txBody>
       </p:sp>
     </p:spTree>
-    <p:extLst>
-      <p:ext uri="{BB962C8B-B14F-4D97-AF65-F5344CB8AC3E}">
-        <p14:creationId xmlns:p14="http://schemas.microsoft.com/office/powerpoint/2010/main" val="1684561004"/>
-      </p:ext>
-    </p:extLst>
   </p:cSld>
   <p:clrMapOvr>
     <a:masterClrMapping/>
@@ -4773,7 +5294,7 @@
 </file>
 
 <file path=ppt/slides/slide7.xml><?xml version="1.0" encoding="utf-8"?>
-<p:sld xmlns:a="http://schemas.openxmlformats.org/drawingml/2006/main" xmlns:r="http://schemas.openxmlformats.org/officeDocument/2006/relationships" xmlns:p="http://schemas.openxmlformats.org/presentationml/2006/main">
+<p:sld xmlns:a="http://schemas.openxmlformats.org/drawingml/2006/main" xmlns:r="http://schemas.openxmlformats.org/officeDocument/2006/relationships" xmlns:mc="http://schemas.openxmlformats.org/markup-compatibility/2006" xmlns:mv="urn:schemas-microsoft-com:mac:vml" xmlns:p="http://schemas.openxmlformats.org/presentationml/2006/main" mc:Ignorable="mv" mc:PreserveAttributes="mv:*">
   <p:cSld>
     <p:spTree>
       <p:nvGrpSpPr>
@@ -4806,7 +5327,7 @@
           <a:p>
             <a:r>
               <a:rPr lang="en-US" dirty="0" smtClean="0"/>
-              <a:t>Project Reflection Overview</a:t>
+              <a:t>Design Evolution</a:t>
             </a:r>
             <a:endParaRPr lang="en-US" dirty="0"/>
           </a:p>
@@ -4824,40 +5345,109 @@
         </p:nvSpPr>
         <p:spPr/>
         <p:txBody>
-          <a:bodyPr>
-            <a:normAutofit/>
-          </a:bodyPr>
+          <a:bodyPr/>
           <a:lstStyle/>
           <a:p>
             <a:r>
               <a:rPr lang="en-US" sz="3200" dirty="0" smtClean="0"/>
-              <a:t>What did we learn?</a:t>
-            </a:r>
-          </a:p>
-          <a:p>
+              <a:t>No web </a:t>
+            </a:r>
             <a:r>
               <a:rPr lang="en-US" sz="3200" dirty="0" smtClean="0"/>
-              <a:t>How could we have improved the project?</a:t>
-            </a:r>
+              <a:t>development experience</a:t>
+            </a:r>
+            <a:endParaRPr lang="en-US" sz="3200" dirty="0" smtClean="0"/>
           </a:p>
           <a:p>
             <a:r>
               <a:rPr lang="en-US" sz="3200" dirty="0" smtClean="0"/>
-              <a:t>What is one thing we would change?</a:t>
-            </a:r>
+              <a:t>Languages</a:t>
+            </a:r>
+          </a:p>
+          <a:p>
+            <a:pPr lvl="1"/>
+            <a:r>
+              <a:rPr lang="en-US" sz="2800" dirty="0" smtClean="0"/>
+              <a:t>Intended to use </a:t>
+            </a:r>
+            <a:r>
+              <a:rPr lang="en-US" sz="2800" dirty="0" err="1" smtClean="0"/>
+              <a:t>php</a:t>
+            </a:r>
+            <a:r>
+              <a:rPr lang="en-US" sz="2800" dirty="0" smtClean="0"/>
+              <a:t>, </a:t>
+            </a:r>
+            <a:r>
+              <a:rPr lang="en-US" sz="2800" dirty="0" err="1" smtClean="0"/>
+              <a:t>mysql</a:t>
+            </a:r>
+            <a:r>
+              <a:rPr lang="en-US" sz="2800" dirty="0" smtClean="0"/>
+              <a:t>, </a:t>
+            </a:r>
+            <a:r>
+              <a:rPr lang="en-US" sz="2800" dirty="0" err="1" smtClean="0"/>
+              <a:t>javascript</a:t>
+            </a:r>
+            <a:endParaRPr lang="en-US" sz="2800" dirty="0" smtClean="0"/>
+          </a:p>
+          <a:p>
+            <a:pPr lvl="1"/>
+            <a:r>
+              <a:rPr lang="en-US" sz="2800" dirty="0" smtClean="0"/>
+              <a:t>Minimal </a:t>
+            </a:r>
+            <a:r>
+              <a:rPr lang="en-US" sz="2800" dirty="0" err="1" smtClean="0"/>
+              <a:t>javascript</a:t>
+            </a:r>
+            <a:endParaRPr lang="en-US" sz="2800" dirty="0" smtClean="0"/>
           </a:p>
           <a:p>
             <a:r>
               <a:rPr lang="en-US" sz="3200" dirty="0" smtClean="0"/>
-              <a:t>Key Technologies</a:t>
-            </a:r>
+              <a:t>MVC architecture</a:t>
+            </a:r>
+          </a:p>
+          <a:p>
+            <a:pPr lvl="1"/>
+            <a:r>
+              <a:rPr lang="en-US" sz="2800" dirty="0" smtClean="0"/>
+              <a:t>Getters/Setters in model</a:t>
+            </a:r>
+          </a:p>
+          <a:p>
+            <a:pPr lvl="1"/>
+            <a:r>
+              <a:rPr lang="en-US" sz="2800" dirty="0" smtClean="0"/>
+              <a:t>Sorting redirecting in controller</a:t>
+            </a:r>
+          </a:p>
+          <a:p>
+            <a:pPr lvl="1"/>
+            <a:r>
+              <a:rPr lang="en-US" sz="2800" dirty="0" err="1" smtClean="0"/>
+              <a:t>Php</a:t>
+            </a:r>
+            <a:r>
+              <a:rPr lang="en-US" sz="2800" dirty="0" smtClean="0"/>
+              <a:t> pages in views</a:t>
+            </a:r>
+            <a:endParaRPr lang="en-US" sz="2800" dirty="0" smtClean="0"/>
+          </a:p>
+          <a:p>
+            <a:endParaRPr lang="en-US" sz="3200" dirty="0" smtClean="0"/>
+          </a:p>
+          <a:p>
+            <a:endParaRPr lang="en-US" dirty="0"/>
           </a:p>
         </p:txBody>
       </p:sp>
     </p:spTree>
     <p:extLst>
       <p:ext uri="{BB962C8B-B14F-4D97-AF65-F5344CB8AC3E}">
-        <p14:creationId xmlns:p14="http://schemas.microsoft.com/office/powerpoint/2010/main" val="1366968568"/>
+        <p14:creationId xmlns:p14="http://schemas.microsoft.com/office/powerpoint/2010/main" xmlns:p="http://schemas.openxmlformats.org/presentationml/2006/main" xmlns:r="http://schemas.openxmlformats.org/officeDocument/2006/relationships" xmlns:a="http://schemas.openxmlformats.org/drawingml/2006/main" xmlns="" val="297214769"/>
       </p:ext>
     </p:extLst>
   </p:cSld>
@@ -4868,7 +5458,7 @@
 </file>
 
 <file path=ppt/slides/slide8.xml><?xml version="1.0" encoding="utf-8"?>
-<p:sld xmlns:a="http://schemas.openxmlformats.org/drawingml/2006/main" xmlns:r="http://schemas.openxmlformats.org/officeDocument/2006/relationships" xmlns:p="http://schemas.openxmlformats.org/presentationml/2006/main">
+<p:sld xmlns:a="http://schemas.openxmlformats.org/drawingml/2006/main" xmlns:r="http://schemas.openxmlformats.org/officeDocument/2006/relationships" xmlns:mc="http://schemas.openxmlformats.org/markup-compatibility/2006" xmlns:mv="urn:schemas-microsoft-com:mac:vml" xmlns:p="http://schemas.openxmlformats.org/presentationml/2006/main" mc:Ignorable="mv" mc:PreserveAttributes="mv:*">
   <p:cSld>
     <p:spTree>
       <p:nvGrpSpPr>
@@ -4901,7 +5491,7 @@
           <a:p>
             <a:r>
               <a:rPr lang="en-US" dirty="0" smtClean="0"/>
-              <a:t>What did we learn?</a:t>
+              <a:t>Missing Features</a:t>
             </a:r>
             <a:endParaRPr lang="en-US" dirty="0"/>
           </a:p>
@@ -4919,70 +5509,61 @@
         </p:nvSpPr>
         <p:spPr/>
         <p:txBody>
-          <a:bodyPr/>
+          <a:bodyPr>
+            <a:normAutofit/>
+          </a:bodyPr>
           <a:lstStyle/>
           <a:p>
             <a:r>
               <a:rPr lang="en-US" sz="3200" dirty="0" smtClean="0"/>
-              <a:t>Crash course in web development</a:t>
-            </a:r>
-          </a:p>
-          <a:p>
+              <a:t>UI design</a:t>
+            </a:r>
+          </a:p>
+          <a:p>
+            <a:pPr lvl="1"/>
+            <a:r>
+              <a:rPr lang="en-US" sz="2800" dirty="0" smtClean="0"/>
+              <a:t>Missing CSS</a:t>
+            </a:r>
+          </a:p>
+          <a:p>
+            <a:r>
+              <a:rPr lang="en-US" sz="3200" dirty="0"/>
+              <a:t>Requirements 2 and 14 were dropped from the required list of </a:t>
+            </a:r>
             <a:r>
               <a:rPr lang="en-US" sz="3200" dirty="0" smtClean="0"/>
-              <a:t>Teammate Problems</a:t>
-            </a:r>
+              <a:t>functionalities</a:t>
+            </a:r>
+          </a:p>
+          <a:p>
+            <a:r>
+              <a:rPr lang="en-US" sz="3200" dirty="0" smtClean="0"/>
+              <a:t>Still Implementing:</a:t>
+            </a:r>
+            <a:endParaRPr lang="en-US" sz="3200" dirty="0" smtClean="0"/>
           </a:p>
           <a:p>
             <a:pPr lvl="1"/>
             <a:r>
               <a:rPr lang="en-US" sz="2800" dirty="0" smtClean="0"/>
-              <a:t>1 member was dropped</a:t>
-            </a:r>
-          </a:p>
-          <a:p>
-            <a:r>
-              <a:rPr lang="en-US" sz="3200" dirty="0" smtClean="0"/>
-              <a:t>Division of Labor</a:t>
-            </a:r>
-          </a:p>
-          <a:p>
-            <a:r>
-              <a:rPr lang="en-US" sz="3200" dirty="0" smtClean="0"/>
-              <a:t>Internal vs. External Deadlines</a:t>
-            </a:r>
-          </a:p>
-          <a:p>
-            <a:endParaRPr lang="en-US" sz="3200" dirty="0" smtClean="0"/>
-          </a:p>
-          <a:p>
-            <a:endParaRPr lang="en-US" sz="3200" dirty="0" smtClean="0"/>
-          </a:p>
-          <a:p>
-            <a:pPr lvl="1"/>
-            <a:endParaRPr lang="en-US" sz="2800" dirty="0" smtClean="0"/>
-          </a:p>
-          <a:p>
-            <a:endParaRPr lang="en-US" sz="3200" dirty="0"/>
-          </a:p>
-          <a:p>
-            <a:endParaRPr lang="en-US" sz="3200" dirty="0" smtClean="0"/>
-          </a:p>
-          <a:p>
-            <a:endParaRPr lang="en-US" sz="3200" dirty="0" smtClean="0"/>
-          </a:p>
-          <a:p>
-            <a:endParaRPr lang="en-US" sz="3200" dirty="0" smtClean="0"/>
-          </a:p>
-          <a:p>
-            <a:endParaRPr lang="en-US" dirty="0"/>
+              <a:t>Requirement </a:t>
+            </a:r>
+            <a:r>
+              <a:rPr lang="en-US" sz="2800" dirty="0" smtClean="0"/>
+              <a:t>13-</a:t>
+            </a:r>
+            <a:r>
+              <a:rPr lang="en-US" sz="2800" dirty="0" smtClean="0"/>
+              <a:t> finish sorting Posts</a:t>
+            </a:r>
           </a:p>
         </p:txBody>
       </p:sp>
     </p:spTree>
     <p:extLst>
       <p:ext uri="{BB962C8B-B14F-4D97-AF65-F5344CB8AC3E}">
-        <p14:creationId xmlns:p14="http://schemas.microsoft.com/office/powerpoint/2010/main" val="85277640"/>
+        <p14:creationId xmlns:p14="http://schemas.microsoft.com/office/powerpoint/2010/main" xmlns:p="http://schemas.openxmlformats.org/presentationml/2006/main" xmlns:r="http://schemas.openxmlformats.org/officeDocument/2006/relationships" xmlns:a="http://schemas.openxmlformats.org/drawingml/2006/main" xmlns="" val="1684561004"/>
       </p:ext>
     </p:extLst>
   </p:cSld>
@@ -4993,7 +5574,7 @@
 </file>
 
 <file path=ppt/slides/slide9.xml><?xml version="1.0" encoding="utf-8"?>
-<p:sld xmlns:a="http://schemas.openxmlformats.org/drawingml/2006/main" xmlns:r="http://schemas.openxmlformats.org/officeDocument/2006/relationships" xmlns:p="http://schemas.openxmlformats.org/presentationml/2006/main">
+<p:sld xmlns:a="http://schemas.openxmlformats.org/drawingml/2006/main" xmlns:r="http://schemas.openxmlformats.org/officeDocument/2006/relationships" xmlns:mc="http://schemas.openxmlformats.org/markup-compatibility/2006" xmlns:mv="urn:schemas-microsoft-com:mac:vml" xmlns:p="http://schemas.openxmlformats.org/presentationml/2006/main" mc:Ignorable="mv" mc:PreserveAttributes="mv:*">
   <p:cSld>
     <p:spTree>
       <p:nvGrpSpPr>
@@ -5026,136 +5607,58 @@
           <a:p>
             <a:r>
               <a:rPr lang="en-US" dirty="0" smtClean="0"/>
-              <a:t>Commits </a:t>
+              <a:t>Project Reflection Overview</a:t>
             </a:r>
             <a:endParaRPr lang="en-US" dirty="0"/>
           </a:p>
         </p:txBody>
       </p:sp>
-      <p:pic>
-        <p:nvPicPr>
-          <p:cNvPr id="4" name="Content Placeholder 3"/>
-          <p:cNvPicPr>
-            <a:picLocks noGrp="1" noChangeAspect="1"/>
-          </p:cNvPicPr>
+      <p:sp>
+        <p:nvSpPr>
+          <p:cNvPr id="3" name="Content Placeholder 2"/>
+          <p:cNvSpPr>
+            <a:spLocks noGrp="1"/>
+          </p:cNvSpPr>
           <p:nvPr>
             <p:ph idx="1"/>
           </p:nvPr>
-        </p:nvPicPr>
-        <p:blipFill>
-          <a:blip r:embed="rId2">
-            <a:extLst>
-              <a:ext uri="{28A0092B-C50C-407E-A947-70E740481C1C}">
-                <a14:useLocalDpi xmlns:a14="http://schemas.microsoft.com/office/drawing/2010/main" val="0"/>
-              </a:ext>
-            </a:extLst>
-          </a:blip>
-          <a:stretch>
-            <a:fillRect/>
-          </a:stretch>
-        </p:blipFill>
-        <p:spPr>
-          <a:xfrm>
-            <a:off x="0" y="3581400"/>
-            <a:ext cx="9175280" cy="3276600"/>
-          </a:xfrm>
-        </p:spPr>
-      </p:pic>
-      <p:sp>
-        <p:nvSpPr>
-          <p:cNvPr id="5" name="TextBox 4"/>
-          <p:cNvSpPr txBox="1"/>
-          <p:nvPr/>
-        </p:nvSpPr>
-        <p:spPr>
-          <a:xfrm>
-            <a:off x="422564" y="1752600"/>
-            <a:ext cx="8188036" cy="1846659"/>
-          </a:xfrm>
-          <a:prstGeom prst="rect">
-            <a:avLst/>
-          </a:prstGeom>
-          <a:noFill/>
-        </p:spPr>
-        <p:txBody>
-          <a:bodyPr wrap="square" rtlCol="0">
-            <a:spAutoFit/>
+        </p:nvSpPr>
+        <p:spPr/>
+        <p:txBody>
+          <a:bodyPr>
+            <a:normAutofit/>
           </a:bodyPr>
           <a:lstStyle/>
           <a:p>
             <a:r>
-              <a:rPr lang="da-DK" sz="2400" b="1" dirty="0" smtClean="0"/>
-              <a:t>November 08 2013 - December 08 2013:</a:t>
-            </a:r>
-            <a:endParaRPr lang="en-US" sz="2400" b="1" dirty="0" smtClean="0"/>
-          </a:p>
-          <a:p>
-            <a:r>
-              <a:rPr lang="en-US" sz="2400" b="1" dirty="0" smtClean="0"/>
-              <a:t>3 authors</a:t>
-            </a:r>
-            <a:r>
-              <a:rPr lang="en-US" sz="2400" dirty="0" smtClean="0"/>
-              <a:t> have pushed </a:t>
-            </a:r>
-            <a:r>
-              <a:rPr lang="en-US" sz="2400" b="1" dirty="0" smtClean="0"/>
-              <a:t>55 commits</a:t>
-            </a:r>
-            <a:r>
-              <a:rPr lang="en-US" sz="2400" dirty="0" smtClean="0"/>
-              <a:t> to all branches, excluding merges. On master, </a:t>
-            </a:r>
-            <a:r>
-              <a:rPr lang="en-US" sz="2400" b="1" dirty="0" smtClean="0"/>
-              <a:t>26 files</a:t>
-            </a:r>
-            <a:r>
-              <a:rPr lang="en-US" sz="2400" dirty="0" smtClean="0"/>
-              <a:t> have changed and there have been </a:t>
-            </a:r>
-            <a:r>
-              <a:rPr lang="en-US" sz="2400" b="1" dirty="0" smtClean="0"/>
-              <a:t>3,809</a:t>
-            </a:r>
-            <a:r>
-              <a:rPr lang="en-US" sz="2400" dirty="0" smtClean="0"/>
-              <a:t> </a:t>
-            </a:r>
-            <a:r>
-              <a:rPr lang="en-US" sz="2400" b="1" dirty="0" smtClean="0"/>
-              <a:t>additions</a:t>
-            </a:r>
-            <a:r>
-              <a:rPr lang="en-US" sz="2400" dirty="0" smtClean="0"/>
-              <a:t> and </a:t>
-            </a:r>
-            <a:r>
-              <a:rPr lang="en-US" sz="2400" b="1" dirty="0" smtClean="0"/>
-              <a:t>0</a:t>
-            </a:r>
-            <a:r>
-              <a:rPr lang="en-US" sz="2400" dirty="0" smtClean="0"/>
-              <a:t> </a:t>
-            </a:r>
-            <a:r>
-              <a:rPr lang="en-US" sz="2400" b="1" dirty="0" smtClean="0"/>
-              <a:t>deletions</a:t>
-            </a:r>
-            <a:r>
-              <a:rPr lang="en-US" sz="2400" dirty="0" smtClean="0"/>
-              <a:t>. </a:t>
-            </a:r>
-          </a:p>
-          <a:p>
-            <a:endParaRPr lang="en-US" dirty="0"/>
+              <a:rPr lang="en-US" sz="3200" dirty="0" smtClean="0"/>
+              <a:t>What did we learn?</a:t>
+            </a:r>
+          </a:p>
+          <a:p>
+            <a:r>
+              <a:rPr lang="en-US" sz="3200" dirty="0" smtClean="0"/>
+              <a:t>How could we have improved the project?</a:t>
+            </a:r>
+          </a:p>
+          <a:p>
+            <a:r>
+              <a:rPr lang="en-US" sz="3200" dirty="0" smtClean="0"/>
+              <a:t>What is one thing we would change?</a:t>
+            </a:r>
+          </a:p>
+          <a:p>
+            <a:r>
+              <a:rPr lang="en-US" sz="3200" dirty="0" smtClean="0"/>
+              <a:t>Key Technologies</a:t>
+            </a:r>
           </a:p>
         </p:txBody>
       </p:sp>
     </p:spTree>
     <p:extLst>
       <p:ext uri="{BB962C8B-B14F-4D97-AF65-F5344CB8AC3E}">
-        <p14:creationId xmlns:p14="http://schemas.microsoft.com/office/powerpoint/2010/main" val="1100947228"/>
+        <p14:creationId xmlns:p14="http://schemas.microsoft.com/office/powerpoint/2010/main" xmlns:p="http://schemas.openxmlformats.org/presentationml/2006/main" xmlns:r="http://schemas.openxmlformats.org/officeDocument/2006/relationships" xmlns:a="http://schemas.openxmlformats.org/drawingml/2006/main" xmlns="" val="1366968568"/>
       </p:ext>
     </p:extLst>
   </p:cSld>

</xml_diff>